<commit_message>
Điều chỉnh bài 4 - 5, thêm ds sdh
</commit_message>
<xml_diff>
--- a/Bai 5 Lý thuyết xác suất trong tìm kiếm, BIM va Okapi BM25.pptx
+++ b/Bai 5 Lý thuyết xác suất trong tìm kiếm, BIM va Okapi BM25.pptx
@@ -33,8 +33,8 @@
     <p:sldId id="421" r:id="rId24"/>
     <p:sldId id="422" r:id="rId25"/>
     <p:sldId id="371" r:id="rId26"/>
-    <p:sldId id="387" r:id="rId27"/>
-    <p:sldId id="372" r:id="rId28"/>
+    <p:sldId id="372" r:id="rId27"/>
+    <p:sldId id="387" r:id="rId28"/>
     <p:sldId id="303" r:id="rId29"/>
     <p:sldId id="400" r:id="rId30"/>
     <p:sldId id="397" r:id="rId31"/>
@@ -175,7 +175,7 @@
   </p:defaultTextStyle>
   <p:extLst>
     <p:ext uri="{EFAFB233-063F-42B5-8137-9DF3F51BA10A}">
-      <p15:sldGuideLst xmlns="" xmlns:p15="http://schemas.microsoft.com/office/powerpoint/2012/main">
+      <p15:sldGuideLst xmlns:p15="http://schemas.microsoft.com/office/powerpoint/2012/main" xmlns="">
         <p15:guide id="1" orient="horz" pos="2160">
           <p15:clr>
             <a:srgbClr val="A4A3A4"/>
@@ -1107,6 +1107,104 @@
     <p:extLst>
       <p:ext uri="{BB962C8B-B14F-4D97-AF65-F5344CB8AC3E}">
         <p14:creationId xmlns:p14="http://schemas.microsoft.com/office/powerpoint/2010/main" val="1191619375"/>
+      </p:ext>
+    </p:extLst>
+  </p:cSld>
+  <p:clrMapOvr>
+    <a:masterClrMapping/>
+  </p:clrMapOvr>
+</p:notes>
+</file>
+
+<file path=ppt/notesSlides/notesSlide4.xml><?xml version="1.0" encoding="utf-8"?>
+<p:notes xmlns:a="http://schemas.openxmlformats.org/drawingml/2006/main" xmlns:r="http://schemas.openxmlformats.org/officeDocument/2006/relationships" xmlns:p="http://schemas.openxmlformats.org/presentationml/2006/main">
+  <p:cSld>
+    <p:spTree>
+      <p:nvGrpSpPr>
+        <p:cNvPr id="1" name=""/>
+        <p:cNvGrpSpPr/>
+        <p:nvPr/>
+      </p:nvGrpSpPr>
+      <p:grpSpPr>
+        <a:xfrm>
+          <a:off x="0" y="0"/>
+          <a:ext cx="0" cy="0"/>
+          <a:chOff x="0" y="0"/>
+          <a:chExt cx="0" cy="0"/>
+        </a:xfrm>
+      </p:grpSpPr>
+      <p:sp>
+        <p:nvSpPr>
+          <p:cNvPr id="2" name="Slide Image Placeholder 1"/>
+          <p:cNvSpPr>
+            <a:spLocks noGrp="1" noRot="1" noChangeAspect="1"/>
+          </p:cNvSpPr>
+          <p:nvPr>
+            <p:ph type="sldImg"/>
+          </p:nvPr>
+        </p:nvSpPr>
+        <p:spPr/>
+      </p:sp>
+      <p:sp>
+        <p:nvSpPr>
+          <p:cNvPr id="3" name="Notes Placeholder 2"/>
+          <p:cNvSpPr>
+            <a:spLocks noGrp="1"/>
+          </p:cNvSpPr>
+          <p:nvPr>
+            <p:ph type="body" idx="1"/>
+          </p:nvPr>
+        </p:nvSpPr>
+        <p:spPr/>
+        <p:txBody>
+          <a:bodyPr/>
+          <a:lstStyle/>
+          <a:p>
+            <a:r>
+              <a:rPr lang="en-US" smtClean="0"/>
+              <a:t>N-df hay</a:t>
+            </a:r>
+            <a:r>
+              <a:rPr lang="en-US" baseline="0" smtClean="0"/>
+              <a:t> (N-df)/df??</a:t>
+            </a:r>
+            <a:endParaRPr lang="vi-VN"/>
+          </a:p>
+        </p:txBody>
+      </p:sp>
+      <p:sp>
+        <p:nvSpPr>
+          <p:cNvPr id="4" name="Slide Number Placeholder 3"/>
+          <p:cNvSpPr>
+            <a:spLocks noGrp="1"/>
+          </p:cNvSpPr>
+          <p:nvPr>
+            <p:ph type="sldNum" sz="quarter" idx="10"/>
+          </p:nvPr>
+        </p:nvSpPr>
+        <p:spPr/>
+        <p:txBody>
+          <a:bodyPr/>
+          <a:lstStyle/>
+          <a:p>
+            <a:pPr>
+              <a:defRPr/>
+            </a:pPr>
+            <a:fld id="{131176AC-51AD-4618-B133-B0872FB5542B}" type="slidenum">
+              <a:rPr lang="vi-VN" smtClean="0"/>
+              <a:pPr>
+                <a:defRPr/>
+              </a:pPr>
+              <a:t>34</a:t>
+            </a:fld>
+            <a:endParaRPr lang="vi-VN"/>
+          </a:p>
+        </p:txBody>
+      </p:sp>
+    </p:spTree>
+    <p:extLst>
+      <p:ext uri="{BB962C8B-B14F-4D97-AF65-F5344CB8AC3E}">
+        <p14:creationId xmlns:p14="http://schemas.microsoft.com/office/powerpoint/2010/main" val="2067007414"/>
       </p:ext>
     </p:extLst>
   </p:cSld>
@@ -7777,7 +7875,7 @@
           <a:graphicData uri="http://schemas.openxmlformats.org/presentationml/2006/ole">
             <mc:AlternateContent xmlns:mc="http://schemas.openxmlformats.org/markup-compatibility/2006">
               <mc:Choice xmlns:v="urn:schemas-microsoft-com:vml" Requires="v">
-                <p:oleObj spid="_x0000_s13001" name="Equation" r:id="rId3" imgW="1218960" imgH="203040" progId="Equation.3">
+                <p:oleObj spid="_x0000_s13033" name="Equation" r:id="rId3" imgW="1218960" imgH="203040" progId="Equation.3">
                   <p:embed/>
                 </p:oleObj>
               </mc:Choice>
@@ -7870,7 +7968,7 @@
           <a:graphicData uri="http://schemas.openxmlformats.org/presentationml/2006/ole">
             <mc:AlternateContent xmlns:mc="http://schemas.openxmlformats.org/markup-compatibility/2006">
               <mc:Choice xmlns:v="urn:schemas-microsoft-com:vml" Requires="v">
-                <p:oleObj spid="_x0000_s13002" name="Equation" r:id="rId5" imgW="1524000" imgH="419100" progId="Equation.3">
+                <p:oleObj spid="_x0000_s13034" name="Equation" r:id="rId5" imgW="1524000" imgH="419100" progId="Equation.3">
                   <p:embed/>
                 </p:oleObj>
               </mc:Choice>
@@ -8212,7 +8310,7 @@
           <a:graphicData uri="http://schemas.openxmlformats.org/presentationml/2006/ole">
             <mc:AlternateContent xmlns:mc="http://schemas.openxmlformats.org/markup-compatibility/2006">
               <mc:Choice xmlns:v="urn:schemas-microsoft-com:vml" Requires="v">
-                <p:oleObj spid="_x0000_s13003" name="Equation" r:id="rId7" imgW="1473200" imgH="203200" progId="Equation.3">
+                <p:oleObj spid="_x0000_s13035" name="Equation" r:id="rId7" imgW="1473200" imgH="203200" progId="Equation.3">
                   <p:embed/>
                 </p:oleObj>
               </mc:Choice>
@@ -8311,7 +8409,7 @@
           <a:graphicData uri="http://schemas.openxmlformats.org/presentationml/2006/ole">
             <mc:AlternateContent xmlns:mc="http://schemas.openxmlformats.org/markup-compatibility/2006">
               <mc:Choice xmlns:v="urn:schemas-microsoft-com:vml" Requires="v">
-                <p:oleObj spid="_x0000_s13004" name="Equation" r:id="rId9" imgW="1473200" imgH="203200" progId="Equation.3">
+                <p:oleObj spid="_x0000_s13036" name="Equation" r:id="rId9" imgW="1473200" imgH="203200" progId="Equation.3">
                   <p:embed/>
                 </p:oleObj>
               </mc:Choice>
@@ -8548,7 +8646,7 @@
             <a:graphicData uri="http://schemas.openxmlformats.org/presentationml/2006/ole">
               <mc:AlternateContent xmlns:mc="http://schemas.openxmlformats.org/markup-compatibility/2006">
                 <mc:Choice xmlns:v="urn:schemas-microsoft-com:vml" Requires="v">
-                  <p:oleObj spid="_x0000_s13701" name="Формула" r:id="rId3" imgW="1574800" imgH="241300" progId="Equation.3">
+                  <p:oleObj spid="_x0000_s13717" name="Формула" r:id="rId3" imgW="1574800" imgH="241300" progId="Equation.3">
                     <p:embed/>
                   </p:oleObj>
                 </mc:Choice>
@@ -8885,7 +8983,7 @@
           <a:graphicData uri="http://schemas.openxmlformats.org/presentationml/2006/ole">
             <mc:AlternateContent xmlns:mc="http://schemas.openxmlformats.org/markup-compatibility/2006">
               <mc:Choice xmlns:v="urn:schemas-microsoft-com:vml" Requires="v">
-                <p:oleObj spid="_x0000_s13702" name="Equation" r:id="rId5" imgW="2501900" imgH="558800" progId="Equation.3">
+                <p:oleObj spid="_x0000_s13718" name="Equation" r:id="rId5" imgW="2501900" imgH="558800" progId="Equation.3">
                   <p:embed/>
                 </p:oleObj>
               </mc:Choice>
@@ -9936,7 +10034,7 @@
           <a:graphicData uri="http://schemas.openxmlformats.org/presentationml/2006/ole">
             <mc:AlternateContent xmlns:mc="http://schemas.openxmlformats.org/markup-compatibility/2006">
               <mc:Choice xmlns:v="urn:schemas-microsoft-com:vml" Requires="v">
-                <p:oleObj spid="_x0000_s14519" name="Формула" r:id="rId3" imgW="1524000" imgH="431800" progId="Equation.3">
+                <p:oleObj spid="_x0000_s14527" name="Формула" r:id="rId3" imgW="1524000" imgH="431800" progId="Equation.3">
                   <p:embed/>
                 </p:oleObj>
               </mc:Choice>
@@ -11070,7 +11168,6 @@
               <a:rPr lang="en-US" sz="2800" dirty="0" smtClean="0"/>
               <a:t>;</a:t>
             </a:r>
-            <a:endParaRPr lang="en-US" sz="2800" dirty="0" smtClean="0"/>
           </a:p>
           <a:p>
             <a:pPr algn="just" eaLnBrk="1" hangingPunct="1"/>
@@ -11204,7 +11301,7 @@
           <a:graphicData uri="http://schemas.openxmlformats.org/presentationml/2006/ole">
             <mc:AlternateContent xmlns:mc="http://schemas.openxmlformats.org/markup-compatibility/2006">
               <mc:Choice xmlns:v="urn:schemas-microsoft-com:vml" Requires="v">
-                <p:oleObj spid="_x0000_s15541" name="Equation" r:id="rId3" imgW="914400" imgH="266400" progId="Equation.3">
+                <p:oleObj spid="_x0000_s15549" name="Equation" r:id="rId3" imgW="914400" imgH="266400" progId="Equation.3">
                   <p:embed/>
                 </p:oleObj>
               </mc:Choice>
@@ -11727,7 +11824,7 @@
           <a:graphicData uri="http://schemas.openxmlformats.org/presentationml/2006/ole">
             <mc:AlternateContent xmlns:mc="http://schemas.openxmlformats.org/markup-compatibility/2006">
               <mc:Choice xmlns:v="urn:schemas-microsoft-com:vml" Requires="v">
-                <p:oleObj spid="_x0000_s16565" name="Equation" r:id="rId3" imgW="3454200" imgH="812520" progId="Equation.3">
+                <p:oleObj spid="_x0000_s16573" name="Equation" r:id="rId3" imgW="3454200" imgH="812520" progId="Equation.3">
                   <p:embed/>
                 </p:oleObj>
               </mc:Choice>
@@ -13001,7 +13098,7 @@
           <a:graphicData uri="http://schemas.openxmlformats.org/presentationml/2006/ole">
             <mc:AlternateContent xmlns:mc="http://schemas.openxmlformats.org/markup-compatibility/2006">
               <mc:Choice xmlns:v="urn:schemas-microsoft-com:vml" Requires="v">
-                <p:oleObj spid="_x0000_s17949" name="Equation" r:id="rId3" imgW="2489040" imgH="444240" progId="Equation.3">
+                <p:oleObj spid="_x0000_s17973" name="Equation" r:id="rId3" imgW="2489040" imgH="444240" progId="Equation.3">
                   <p:embed/>
                 </p:oleObj>
               </mc:Choice>
@@ -13096,7 +13193,7 @@
           <a:graphicData uri="http://schemas.openxmlformats.org/presentationml/2006/ole">
             <mc:AlternateContent xmlns:mc="http://schemas.openxmlformats.org/markup-compatibility/2006">
               <mc:Choice xmlns:v="urn:schemas-microsoft-com:vml" Requires="v">
-                <p:oleObj spid="_x0000_s17950" name="Equation" r:id="rId5" imgW="2171520" imgH="444240" progId="Equation.3">
+                <p:oleObj spid="_x0000_s17974" name="Equation" r:id="rId5" imgW="2171520" imgH="444240" progId="Equation.3">
                   <p:embed/>
                 </p:oleObj>
               </mc:Choice>
@@ -13191,7 +13288,7 @@
           <a:graphicData uri="http://schemas.openxmlformats.org/presentationml/2006/ole">
             <mc:AlternateContent xmlns:mc="http://schemas.openxmlformats.org/markup-compatibility/2006">
               <mc:Choice xmlns:v="urn:schemas-microsoft-com:vml" Requires="v">
-                <p:oleObj spid="_x0000_s17951" name="Equation" r:id="rId7" imgW="3530520" imgH="419040" progId="Equation.3">
+                <p:oleObj spid="_x0000_s17975" name="Equation" r:id="rId7" imgW="3530520" imgH="419040" progId="Equation.3">
                   <p:embed/>
                 </p:oleObj>
               </mc:Choice>
@@ -13431,7 +13528,7 @@
             <a:graphicData uri="http://schemas.openxmlformats.org/presentationml/2006/ole">
               <mc:AlternateContent xmlns:mc="http://schemas.openxmlformats.org/markup-compatibility/2006">
                 <mc:Choice xmlns:v="urn:schemas-microsoft-com:vml" Requires="v">
-                  <p:oleObj spid="_x0000_s19327" name="Equation" r:id="rId3" imgW="2489040" imgH="444240" progId="Equation.3">
+                  <p:oleObj spid="_x0000_s19367" name="Equation" r:id="rId3" imgW="2489040" imgH="444240" progId="Equation.3">
                     <p:embed/>
                   </p:oleObj>
                 </mc:Choice>
@@ -13526,7 +13623,7 @@
             <a:graphicData uri="http://schemas.openxmlformats.org/presentationml/2006/ole">
               <mc:AlternateContent xmlns:mc="http://schemas.openxmlformats.org/markup-compatibility/2006">
                 <mc:Choice xmlns:v="urn:schemas-microsoft-com:vml" Requires="v">
-                  <p:oleObj spid="_x0000_s19328" name="Equation" r:id="rId5" imgW="4089240" imgH="469800" progId="Equation.3">
+                  <p:oleObj spid="_x0000_s19368" name="Equation" r:id="rId5" imgW="4089240" imgH="469800" progId="Equation.3">
                     <p:embed/>
                   </p:oleObj>
                 </mc:Choice>
@@ -13926,7 +14023,7 @@
           <a:graphicData uri="http://schemas.openxmlformats.org/presentationml/2006/ole">
             <mc:AlternateContent xmlns:mc="http://schemas.openxmlformats.org/markup-compatibility/2006">
               <mc:Choice xmlns:v="urn:schemas-microsoft-com:vml" Requires="v">
-                <p:oleObj spid="_x0000_s19329" name="Equation" r:id="rId7" imgW="1422360" imgH="228600" progId="Equation.3">
+                <p:oleObj spid="_x0000_s19369" name="Equation" r:id="rId7" imgW="1422360" imgH="228600" progId="Equation.3">
                   <p:embed/>
                 </p:oleObj>
               </mc:Choice>
@@ -14021,7 +14118,7 @@
           <a:graphicData uri="http://schemas.openxmlformats.org/presentationml/2006/ole">
             <mc:AlternateContent xmlns:mc="http://schemas.openxmlformats.org/markup-compatibility/2006">
               <mc:Choice xmlns:v="urn:schemas-microsoft-com:vml" Requires="v">
-                <p:oleObj spid="_x0000_s19330" name="Equation" r:id="rId9" imgW="1334520" imgH="200880" progId="Equation.3">
+                <p:oleObj spid="_x0000_s19370" name="Equation" r:id="rId9" imgW="1334520" imgH="200880" progId="Equation.3">
                   <p:embed/>
                 </p:oleObj>
               </mc:Choice>
@@ -14122,7 +14219,7 @@
           <a:graphicData uri="http://schemas.openxmlformats.org/presentationml/2006/ole">
             <mc:AlternateContent xmlns:mc="http://schemas.openxmlformats.org/markup-compatibility/2006">
               <mc:Choice xmlns:v="urn:schemas-microsoft-com:vml" Requires="v">
-                <p:oleObj spid="_x0000_s19331" name="Equation" r:id="rId11" imgW="2489040" imgH="558720" progId="Equation.3">
+                <p:oleObj spid="_x0000_s19371" name="Equation" r:id="rId11" imgW="2489040" imgH="558720" progId="Equation.3">
                   <p:embed/>
                 </p:oleObj>
               </mc:Choice>
@@ -14879,7 +14976,7 @@
           <a:graphicData uri="http://schemas.openxmlformats.org/presentationml/2006/ole">
             <mc:AlternateContent xmlns:mc="http://schemas.openxmlformats.org/markup-compatibility/2006">
               <mc:Choice xmlns:v="urn:schemas-microsoft-com:vml" Requires="v">
-                <p:oleObj spid="_x0000_s20172" name="Equation" r:id="rId3" imgW="1384200" imgH="228600" progId="Equation.3">
+                <p:oleObj spid="_x0000_s20204" name="Equation" r:id="rId3" imgW="1384200" imgH="228600" progId="Equation.3">
                   <p:embed/>
                 </p:oleObj>
               </mc:Choice>
@@ -14945,7 +15042,7 @@
           <a:graphicData uri="http://schemas.openxmlformats.org/presentationml/2006/ole">
             <mc:AlternateContent xmlns:mc="http://schemas.openxmlformats.org/markup-compatibility/2006">
               <mc:Choice xmlns:v="urn:schemas-microsoft-com:vml" Requires="v">
-                <p:oleObj spid="_x0000_s20173" name="Equation" r:id="rId5" imgW="1358640" imgH="228600" progId="Equation.3">
+                <p:oleObj spid="_x0000_s20205" name="Equation" r:id="rId5" imgW="1358640" imgH="228600" progId="Equation.3">
                   <p:embed/>
                 </p:oleObj>
               </mc:Choice>
@@ -15011,7 +15108,7 @@
           <a:graphicData uri="http://schemas.openxmlformats.org/presentationml/2006/ole">
             <mc:AlternateContent xmlns:mc="http://schemas.openxmlformats.org/markup-compatibility/2006">
               <mc:Choice xmlns:v="urn:schemas-microsoft-com:vml" Requires="v">
-                <p:oleObj spid="_x0000_s20174" name="Equation" r:id="rId7" imgW="1587240" imgH="228600" progId="Equation.3">
+                <p:oleObj spid="_x0000_s20206" name="Equation" r:id="rId7" imgW="1587240" imgH="228600" progId="Equation.3">
                   <p:embed/>
                 </p:oleObj>
               </mc:Choice>
@@ -15077,7 +15174,7 @@
           <a:graphicData uri="http://schemas.openxmlformats.org/presentationml/2006/ole">
             <mc:AlternateContent xmlns:mc="http://schemas.openxmlformats.org/markup-compatibility/2006">
               <mc:Choice xmlns:v="urn:schemas-microsoft-com:vml" Requires="v">
-                <p:oleObj spid="_x0000_s20175" name="Equation" r:id="rId9" imgW="1574640" imgH="228600" progId="Equation.3">
+                <p:oleObj spid="_x0000_s20207" name="Equation" r:id="rId9" imgW="1574640" imgH="228600" progId="Equation.3">
                   <p:embed/>
                 </p:oleObj>
               </mc:Choice>
@@ -17426,7 +17523,7 @@
           <a:graphicData uri="http://schemas.openxmlformats.org/presentationml/2006/ole">
             <mc:AlternateContent xmlns:mc="http://schemas.openxmlformats.org/markup-compatibility/2006">
               <mc:Choice xmlns:v="urn:schemas-microsoft-com:vml" Requires="v">
-                <p:oleObj spid="_x0000_s21029" name="Equation" r:id="rId3" imgW="3492360" imgH="571320" progId="Equation.3">
+                <p:oleObj spid="_x0000_s21053" name="Equation" r:id="rId3" imgW="3492360" imgH="571320" progId="Equation.3">
                   <p:embed/>
                 </p:oleObj>
               </mc:Choice>
@@ -17521,7 +17618,7 @@
           <a:graphicData uri="http://schemas.openxmlformats.org/presentationml/2006/ole">
             <mc:AlternateContent xmlns:mc="http://schemas.openxmlformats.org/markup-compatibility/2006">
               <mc:Choice xmlns:v="urn:schemas-microsoft-com:vml" Requires="v">
-                <p:oleObj spid="_x0000_s21030" name="Equation" r:id="rId5" imgW="2869920" imgH="444240" progId="Equation.3">
+                <p:oleObj spid="_x0000_s21054" name="Equation" r:id="rId5" imgW="2869920" imgH="444240" progId="Equation.3">
                   <p:embed/>
                 </p:oleObj>
               </mc:Choice>
@@ -17616,7 +17713,7 @@
           <a:graphicData uri="http://schemas.openxmlformats.org/presentationml/2006/ole">
             <mc:AlternateContent xmlns:mc="http://schemas.openxmlformats.org/markup-compatibility/2006">
               <mc:Choice xmlns:v="urn:schemas-microsoft-com:vml" Requires="v">
-                <p:oleObj spid="_x0000_s21031" name="Equation" r:id="rId7" imgW="2489040" imgH="533160" progId="Equation.3">
+                <p:oleObj spid="_x0000_s21055" name="Equation" r:id="rId7" imgW="2489040" imgH="533160" progId="Equation.3">
                   <p:embed/>
                 </p:oleObj>
               </mc:Choice>
@@ -19355,7 +19452,7 @@
           <a:graphicData uri="http://schemas.openxmlformats.org/presentationml/2006/ole">
             <mc:AlternateContent xmlns:mc="http://schemas.openxmlformats.org/markup-compatibility/2006">
               <mc:Choice xmlns:v="urn:schemas-microsoft-com:vml" Requires="v">
-                <p:oleObj spid="_x0000_s21874" name="Equation" r:id="rId3" imgW="2869920" imgH="444240" progId="Equation.3">
+                <p:oleObj spid="_x0000_s21890" name="Equation" r:id="rId3" imgW="2869920" imgH="444240" progId="Equation.3">
                   <p:embed/>
                 </p:oleObj>
               </mc:Choice>
@@ -19732,7 +19829,7 @@
             <a:graphicData uri="http://schemas.openxmlformats.org/presentationml/2006/ole">
               <mc:AlternateContent xmlns:mc="http://schemas.openxmlformats.org/markup-compatibility/2006">
                 <mc:Choice xmlns:v="urn:schemas-microsoft-com:vml" Requires="v">
-                  <p:oleObj spid="_x0000_s21875" name="Equation" r:id="rId5" imgW="3162240" imgH="444240" progId="Equation.3">
+                  <p:oleObj spid="_x0000_s21891" name="Equation" r:id="rId5" imgW="3162240" imgH="444240" progId="Equation.3">
                     <p:embed/>
                   </p:oleObj>
                 </mc:Choice>
@@ -20336,25 +20433,25 @@
           <p:nvPr>
             <p:extLst>
               <p:ext uri="{D42A27DB-BD31-4B8C-83A1-F6EECF244321}">
-                <p14:modId xmlns:p14="http://schemas.microsoft.com/office/powerpoint/2010/main" val="3980725982"/>
+                <p14:modId xmlns:p14="http://schemas.microsoft.com/office/powerpoint/2010/main" val="699279972"/>
               </p:ext>
             </p:extLst>
           </p:nvPr>
         </p:nvGraphicFramePr>
         <p:xfrm>
-          <a:off x="971600" y="2679179"/>
-          <a:ext cx="6931025" cy="968375"/>
+          <a:off x="1012825" y="2679700"/>
+          <a:ext cx="6846888" cy="968375"/>
         </p:xfrm>
         <a:graphic>
           <a:graphicData uri="http://schemas.openxmlformats.org/presentationml/2006/ole">
             <mc:AlternateContent xmlns:mc="http://schemas.openxmlformats.org/markup-compatibility/2006">
               <mc:Choice xmlns:v="urn:schemas-microsoft-com:vml" Requires="v">
-                <p:oleObj spid="_x0000_s23065" name="Equation" r:id="rId3" imgW="3162240" imgH="444240" progId="Equation.3">
+                <p:oleObj spid="_x0000_s23089" name="Equation" r:id="rId3" imgW="3124080" imgH="444240" progId="Equation.3">
                   <p:embed/>
                 </p:oleObj>
               </mc:Choice>
               <mc:Fallback>
-                <p:oleObj name="Equation" r:id="rId3" imgW="3162240" imgH="444240" progId="Equation.3">
+                <p:oleObj name="Equation" r:id="rId3" imgW="3124080" imgH="444240" progId="Equation.3">
                   <p:embed/>
                   <p:pic>
                     <p:nvPicPr>
@@ -20373,8 +20470,8 @@
                     </p:blipFill>
                     <p:spPr bwMode="auto">
                       <a:xfrm>
-                        <a:off x="971600" y="2679179"/>
-                        <a:ext cx="6931025" cy="968375"/>
+                        <a:off x="1012825" y="2679700"/>
+                        <a:ext cx="6846888" cy="968375"/>
                       </a:xfrm>
                       <a:prstGeom prst="rect">
                         <a:avLst/>
@@ -20431,25 +20528,25 @@
           <p:nvPr>
             <p:extLst>
               <p:ext uri="{D42A27DB-BD31-4B8C-83A1-F6EECF244321}">
-                <p14:modId xmlns:p14="http://schemas.microsoft.com/office/powerpoint/2010/main" val="145898957"/>
+                <p14:modId xmlns:p14="http://schemas.microsoft.com/office/powerpoint/2010/main" val="1568804811"/>
               </p:ext>
             </p:extLst>
           </p:nvPr>
         </p:nvGraphicFramePr>
         <p:xfrm>
-          <a:off x="985887" y="3972148"/>
-          <a:ext cx="2754313" cy="806450"/>
+          <a:off x="1027113" y="3971925"/>
+          <a:ext cx="2671762" cy="806450"/>
         </p:xfrm>
         <a:graphic>
           <a:graphicData uri="http://schemas.openxmlformats.org/presentationml/2006/ole">
             <mc:AlternateContent xmlns:mc="http://schemas.openxmlformats.org/markup-compatibility/2006">
               <mc:Choice xmlns:v="urn:schemas-microsoft-com:vml" Requires="v">
-                <p:oleObj spid="_x0000_s23066" name="Equation" r:id="rId5" imgW="1257120" imgH="368280" progId="Equation.3">
+                <p:oleObj spid="_x0000_s23090" name="Equation" r:id="rId5" imgW="1218960" imgH="368280" progId="Equation.3">
                   <p:embed/>
                 </p:oleObj>
               </mc:Choice>
               <mc:Fallback>
-                <p:oleObj name="Equation" r:id="rId5" imgW="1257120" imgH="368280" progId="Equation.3">
+                <p:oleObj name="Equation" r:id="rId5" imgW="1218960" imgH="368280" progId="Equation.3">
                   <p:embed/>
                   <p:pic>
                     <p:nvPicPr>
@@ -20468,8 +20565,8 @@
                     </p:blipFill>
                     <p:spPr bwMode="auto">
                       <a:xfrm>
-                        <a:off x="985887" y="3972148"/>
-                        <a:ext cx="2754313" cy="806450"/>
+                        <a:off x="1027113" y="3971925"/>
+                        <a:ext cx="2671762" cy="806450"/>
                       </a:xfrm>
                       <a:prstGeom prst="rect">
                         <a:avLst/>
@@ -20539,7 +20636,7 @@
           <a:graphicData uri="http://schemas.openxmlformats.org/presentationml/2006/ole">
             <mc:AlternateContent xmlns:mc="http://schemas.openxmlformats.org/markup-compatibility/2006">
               <mc:Choice xmlns:v="urn:schemas-microsoft-com:vml" Requires="v">
-                <p:oleObj spid="_x0000_s23067" name="Equation" r:id="rId7" imgW="1066800" imgH="431800" progId="Equation.3">
+                <p:oleObj spid="_x0000_s23091" name="Equation" r:id="rId7" imgW="1066800" imgH="431800" progId="Equation.3">
                   <p:embed/>
                 </p:oleObj>
               </mc:Choice>
@@ -21378,25 +21475,25 @@
           <p:nvPr>
             <p:extLst>
               <p:ext uri="{D42A27DB-BD31-4B8C-83A1-F6EECF244321}">
-                <p14:modId xmlns:p14="http://schemas.microsoft.com/office/powerpoint/2010/main" val="521895517"/>
+                <p14:modId xmlns:p14="http://schemas.microsoft.com/office/powerpoint/2010/main" val="2732003532"/>
               </p:ext>
             </p:extLst>
           </p:nvPr>
         </p:nvGraphicFramePr>
         <p:xfrm>
-          <a:off x="1699964" y="2623418"/>
-          <a:ext cx="6769100" cy="2317750"/>
+          <a:off x="1689100" y="2625725"/>
+          <a:ext cx="6745288" cy="2411413"/>
         </p:xfrm>
         <a:graphic>
           <a:graphicData uri="http://schemas.openxmlformats.org/presentationml/2006/ole">
             <mc:AlternateContent xmlns:mc="http://schemas.openxmlformats.org/markup-compatibility/2006">
               <mc:Choice xmlns:v="urn:schemas-microsoft-com:vml" Requires="v">
-                <p:oleObj spid="_x0000_s41064" name="Документ" r:id="rId3" imgW="6637197" imgH="2384447" progId="Word.Document.8">
+                <p:oleObj spid="_x0000_s41120" name="Document" r:id="rId3" imgW="6660191" imgH="2387698" progId="Word.Document.8">
                   <p:embed/>
                 </p:oleObj>
               </mc:Choice>
               <mc:Fallback>
-                <p:oleObj name="Документ" r:id="rId3" imgW="6637197" imgH="2384447" progId="Word.Document.8">
+                <p:oleObj name="Document" r:id="rId3" imgW="6660191" imgH="2387698" progId="Word.Document.8">
                   <p:embed/>
                   <p:pic>
                     <p:nvPicPr>
@@ -21407,13 +21504,7 @@
                       <p:nvPr/>
                     </p:nvPicPr>
                     <p:blipFill>
-                      <a:blip r:embed="rId4">
-                        <a:extLst>
-                          <a:ext uri="{28A0092B-C50C-407E-A947-70E740481C1C}">
-                            <a14:useLocalDpi xmlns:a14="http://schemas.microsoft.com/office/drawing/2010/main" val="0"/>
-                          </a:ext>
-                        </a:extLst>
-                      </a:blip>
+                      <a:blip r:embed="rId4"/>
                       <a:srcRect/>
                       <a:stretch>
                         <a:fillRect/>
@@ -21421,8 +21512,8 @@
                     </p:blipFill>
                     <p:spPr bwMode="auto">
                       <a:xfrm>
-                        <a:off x="1699964" y="2623418"/>
-                        <a:ext cx="6769100" cy="2317750"/>
+                        <a:off x="1689100" y="2625725"/>
+                        <a:ext cx="6745288" cy="2411413"/>
                       </a:xfrm>
                       <a:prstGeom prst="rect">
                         <a:avLst/>
@@ -21492,7 +21583,7 @@
           <a:graphicData uri="http://schemas.openxmlformats.org/presentationml/2006/ole">
             <mc:AlternateContent xmlns:mc="http://schemas.openxmlformats.org/markup-compatibility/2006">
               <mc:Choice xmlns:v="urn:schemas-microsoft-com:vml" Requires="v">
-                <p:oleObj spid="_x0000_s41065" name="Equation" r:id="rId5" imgW="457002" imgH="393529" progId="Equation.3">
+                <p:oleObj spid="_x0000_s41121" name="Equation" r:id="rId5" imgW="457002" imgH="393529" progId="Equation.3">
                   <p:embed/>
                 </p:oleObj>
               </mc:Choice>
@@ -21593,7 +21684,7 @@
           <a:graphicData uri="http://schemas.openxmlformats.org/presentationml/2006/ole">
             <mc:AlternateContent xmlns:mc="http://schemas.openxmlformats.org/markup-compatibility/2006">
               <mc:Choice xmlns:v="urn:schemas-microsoft-com:vml" Requires="v">
-                <p:oleObj spid="_x0000_s41066" name="Формула" r:id="rId7" imgW="672808" imgH="393529" progId="Equation.3">
+                <p:oleObj spid="_x0000_s41122" name="Формула" r:id="rId7" imgW="672808" imgH="393529" progId="Equation.3">
                   <p:embed/>
                 </p:oleObj>
               </mc:Choice>
@@ -21694,7 +21785,7 @@
           <a:graphicData uri="http://schemas.openxmlformats.org/presentationml/2006/ole">
             <mc:AlternateContent xmlns:mc="http://schemas.openxmlformats.org/markup-compatibility/2006">
               <mc:Choice xmlns:v="urn:schemas-microsoft-com:vml" Requires="v">
-                <p:oleObj spid="_x0000_s41067" name="Equation" r:id="rId9" imgW="2781000" imgH="431640" progId="Equation.3">
+                <p:oleObj spid="_x0000_s41123" name="Equation" r:id="rId9" imgW="2781000" imgH="431640" progId="Equation.3">
                   <p:embed/>
                 </p:oleObj>
               </mc:Choice>
@@ -21818,7 +21909,7 @@
           <a:graphicData uri="http://schemas.openxmlformats.org/presentationml/2006/ole">
             <mc:AlternateContent xmlns:mc="http://schemas.openxmlformats.org/markup-compatibility/2006">
               <mc:Choice xmlns:v="urn:schemas-microsoft-com:vml" Requires="v">
-                <p:oleObj spid="_x0000_s41068" name="Equation" r:id="rId11" imgW="1422360" imgH="228600" progId="Equation.3">
+                <p:oleObj spid="_x0000_s41124" name="Equation" r:id="rId11" imgW="1422360" imgH="228600" progId="Equation.3">
                   <p:embed/>
                 </p:oleObj>
               </mc:Choice>
@@ -21913,7 +22004,7 @@
           <a:graphicData uri="http://schemas.openxmlformats.org/presentationml/2006/ole">
             <mc:AlternateContent xmlns:mc="http://schemas.openxmlformats.org/markup-compatibility/2006">
               <mc:Choice xmlns:v="urn:schemas-microsoft-com:vml" Requires="v">
-                <p:oleObj spid="_x0000_s41069" name="Equation" r:id="rId13" imgW="1334520" imgH="200880" progId="Equation.3">
+                <p:oleObj spid="_x0000_s41125" name="Equation" r:id="rId13" imgW="1334520" imgH="200880" progId="Equation.3">
                   <p:embed/>
                 </p:oleObj>
               </mc:Choice>
@@ -22014,7 +22105,7 @@
           <a:graphicData uri="http://schemas.openxmlformats.org/presentationml/2006/ole">
             <mc:AlternateContent xmlns:mc="http://schemas.openxmlformats.org/markup-compatibility/2006">
               <mc:Choice xmlns:v="urn:schemas-microsoft-com:vml" Requires="v">
-                <p:oleObj spid="_x0000_s41070" name="Equation" r:id="rId15" imgW="1066800" imgH="431800" progId="Equation.3">
+                <p:oleObj spid="_x0000_s41126" name="Equation" r:id="rId15" imgW="1066800" imgH="431800" progId="Equation.3">
                   <p:embed/>
                 </p:oleObj>
               </mc:Choice>
@@ -22143,7 +22234,7 @@
             <a:pPr eaLnBrk="1" hangingPunct="1"/>
             <a:r>
               <a:rPr lang="en-US" sz="3600" smtClean="0"/>
-              <a:t>Trọng số của thuật ngữ</a:t>
+              <a:t>Làm mịn trọng số</a:t>
             </a:r>
             <a:endParaRPr lang="vi-VN" sz="3600" smtClean="0"/>
           </a:p>
@@ -22600,7 +22691,7 @@
           <a:graphicData uri="http://schemas.openxmlformats.org/presentationml/2006/ole">
             <mc:AlternateContent xmlns:mc="http://schemas.openxmlformats.org/markup-compatibility/2006">
               <mc:Choice xmlns:v="urn:schemas-microsoft-com:vml" Requires="v">
-                <p:oleObj spid="_x0000_s24760" name="Equation" r:id="rId3" imgW="2234880" imgH="419040" progId="Equation.3">
+                <p:oleObj spid="_x0000_s24768" name="Equation" r:id="rId3" imgW="2234880" imgH="419040" progId="Equation.3">
                   <p:embed/>
                 </p:oleObj>
               </mc:Choice>
@@ -22740,7 +22831,7 @@
             <a:pPr eaLnBrk="1" hangingPunct="1"/>
             <a:r>
               <a:rPr lang="en-US" sz="3600" smtClean="0"/>
-              <a:t>Tính toán xác suất/từ</a:t>
+              <a:t>Bắt đầu thực hiện truy vấn</a:t>
             </a:r>
             <a:endParaRPr lang="vi-VN" sz="3600" smtClean="0"/>
           </a:p>
@@ -22768,8 +22859,12 @@
           <a:p>
             <a:pPr eaLnBrk="1" hangingPunct="1"/>
             <a:r>
+              <a:rPr lang="en-US" sz="2800" smtClean="0"/>
+              <a:t>Hoàn </a:t>
+            </a:r>
+            <a:r>
               <a:rPr lang="en-US" sz="2800" dirty="0" err="1" smtClean="0"/>
-              <a:t>Khi</a:t>
+              <a:t>toàn</a:t>
             </a:r>
             <a:r>
               <a:rPr lang="en-US" sz="2800" dirty="0" smtClean="0"/>
@@ -22777,7 +22872,7 @@
             </a:r>
             <a:r>
               <a:rPr lang="en-US" sz="2800" dirty="0" err="1" smtClean="0"/>
-              <a:t>bắt</a:t>
+              <a:t>không</a:t>
             </a:r>
             <a:r>
               <a:rPr lang="en-US" sz="2800" dirty="0" smtClean="0"/>
@@ -22785,7 +22880,7 @@
             </a:r>
             <a:r>
               <a:rPr lang="en-US" sz="2800" dirty="0" err="1" smtClean="0"/>
-              <a:t>đầu</a:t>
+              <a:t>biết</a:t>
             </a:r>
             <a:r>
               <a:rPr lang="en-US" sz="2800" dirty="0" smtClean="0"/>
@@ -22793,77 +22888,13 @@
             </a:r>
             <a:r>
               <a:rPr lang="en-US" sz="2800" dirty="0" err="1" smtClean="0"/>
-              <a:t>thực</a:t>
+              <a:t>về</a:t>
             </a:r>
             <a:r>
               <a:rPr lang="en-US" sz="2800" dirty="0" smtClean="0"/>
-              <a:t> </a:t>
-            </a:r>
-            <a:r>
-              <a:rPr lang="en-US" sz="2800" dirty="0" err="1" smtClean="0"/>
-              <a:t>hiện</a:t>
-            </a:r>
-            <a:r>
-              <a:rPr lang="en-US" sz="2800" dirty="0" smtClean="0"/>
-              <a:t> </a:t>
-            </a:r>
-            <a:r>
-              <a:rPr lang="en-US" sz="2800" dirty="0" err="1" smtClean="0"/>
-              <a:t>truy</a:t>
-            </a:r>
-            <a:r>
-              <a:rPr lang="en-US" sz="2800" dirty="0" smtClean="0"/>
-              <a:t> </a:t>
-            </a:r>
-            <a:r>
-              <a:rPr lang="en-US" sz="2800" dirty="0" err="1" smtClean="0"/>
-              <a:t>vấn</a:t>
-            </a:r>
-            <a:endParaRPr lang="en-US" sz="2800" dirty="0" smtClean="0"/>
-          </a:p>
-          <a:p>
-            <a:pPr lvl="1" eaLnBrk="1" hangingPunct="1"/>
-            <a:r>
-              <a:rPr lang="en-US" sz="2400" dirty="0" err="1" smtClean="0"/>
-              <a:t>Hoàn</a:t>
-            </a:r>
-            <a:r>
-              <a:rPr lang="en-US" sz="2400" dirty="0" smtClean="0"/>
-              <a:t> </a:t>
-            </a:r>
-            <a:r>
-              <a:rPr lang="en-US" sz="2400" dirty="0" err="1" smtClean="0"/>
-              <a:t>toàn</a:t>
-            </a:r>
-            <a:r>
-              <a:rPr lang="en-US" sz="2400" dirty="0" smtClean="0"/>
-              <a:t> </a:t>
-            </a:r>
-            <a:r>
-              <a:rPr lang="en-US" sz="2400" dirty="0" err="1" smtClean="0"/>
-              <a:t>không</a:t>
-            </a:r>
-            <a:r>
-              <a:rPr lang="en-US" sz="2400" dirty="0" smtClean="0"/>
-              <a:t> </a:t>
-            </a:r>
-            <a:r>
-              <a:rPr lang="en-US" sz="2400" dirty="0" err="1" smtClean="0"/>
-              <a:t>biết</a:t>
-            </a:r>
-            <a:r>
-              <a:rPr lang="en-US" sz="2400" dirty="0" smtClean="0"/>
-              <a:t> </a:t>
-            </a:r>
-            <a:r>
-              <a:rPr lang="en-US" sz="2400" dirty="0" err="1" smtClean="0"/>
-              <a:t>về</a:t>
-            </a:r>
-            <a:r>
-              <a:rPr lang="en-US" sz="2400" dirty="0" smtClean="0"/>
               <a:t> R</a:t>
             </a:r>
-            <a:endParaRPr lang="vi-VN" sz="2400" dirty="0" smtClean="0"/>
+            <a:endParaRPr lang="vi-VN" sz="2800" dirty="0" smtClean="0"/>
           </a:p>
         </p:txBody>
       </p:sp>
@@ -23120,20 +23151,20 @@
           <p:nvPr>
             <p:extLst>
               <p:ext uri="{D42A27DB-BD31-4B8C-83A1-F6EECF244321}">
-                <p14:modId xmlns:p14="http://schemas.microsoft.com/office/powerpoint/2010/main" val="3425934334"/>
+                <p14:modId xmlns:p14="http://schemas.microsoft.com/office/powerpoint/2010/main" val="2144391477"/>
               </p:ext>
             </p:extLst>
           </p:nvPr>
         </p:nvGraphicFramePr>
         <p:xfrm>
-          <a:off x="3101975" y="3141663"/>
+          <a:off x="3131840" y="2794794"/>
           <a:ext cx="2716213" cy="877887"/>
         </p:xfrm>
         <a:graphic>
           <a:graphicData uri="http://schemas.openxmlformats.org/presentationml/2006/ole">
             <mc:AlternateContent xmlns:mc="http://schemas.openxmlformats.org/markup-compatibility/2006">
               <mc:Choice xmlns:v="urn:schemas-microsoft-com:vml" Requires="v">
-                <p:oleObj spid="_x0000_s25784" name="Equation" r:id="rId3" imgW="1206360" imgH="393480" progId="Equation.DSMT4">
+                <p:oleObj spid="_x0000_s25792" name="Equation" r:id="rId3" imgW="1206360" imgH="393480" progId="Equation.DSMT4">
                   <p:embed/>
                 </p:oleObj>
               </mc:Choice>
@@ -23157,7 +23188,7 @@
                     </p:blipFill>
                     <p:spPr bwMode="auto">
                       <a:xfrm>
-                        <a:off x="3101975" y="3141663"/>
+                        <a:off x="3131840" y="2794794"/>
                         <a:ext cx="2716213" cy="877887"/>
                       </a:xfrm>
                       <a:prstGeom prst="rect">
@@ -23204,7 +23235,7 @@
         </p:nvSpPr>
         <p:spPr bwMode="auto">
           <a:xfrm>
-            <a:off x="611559" y="4365625"/>
+            <a:off x="611881" y="4134792"/>
             <a:ext cx="8208591" cy="461665"/>
           </a:xfrm>
           <a:prstGeom prst="rect">
@@ -24066,7 +24097,7 @@
           <a:graphicData uri="http://schemas.openxmlformats.org/presentationml/2006/ole">
             <mc:AlternateContent xmlns:mc="http://schemas.openxmlformats.org/markup-compatibility/2006">
               <mc:Choice xmlns:v="urn:schemas-microsoft-com:vml" Requires="v">
-                <p:oleObj spid="_x0000_s26806" name="Формула" r:id="rId3" imgW="1371600" imgH="431800" progId="Equation.3">
+                <p:oleObj spid="_x0000_s26814" name="Формула" r:id="rId3" imgW="1371600" imgH="431800" progId="Equation.3">
                   <p:embed/>
                 </p:oleObj>
               </mc:Choice>
@@ -24670,7 +24701,7 @@
           <a:graphicData uri="http://schemas.openxmlformats.org/presentationml/2006/ole">
             <mc:AlternateContent xmlns:mc="http://schemas.openxmlformats.org/markup-compatibility/2006">
               <mc:Choice xmlns:v="urn:schemas-microsoft-com:vml" Requires="v">
-                <p:oleObj spid="_x0000_s28854" name="Формула" r:id="rId3" imgW="1815312" imgH="444307" progId="Equation.3">
+                <p:oleObj spid="_x0000_s28862" name="Формула" r:id="rId3" imgW="1815312" imgH="444307" progId="Equation.3">
                   <p:embed/>
                 </p:oleObj>
               </mc:Choice>
@@ -25123,6 +25154,1059 @@
       </p:grpSpPr>
       <p:sp>
         <p:nvSpPr>
+          <p:cNvPr id="30723" name="Rectangle 7"/>
+          <p:cNvSpPr>
+            <a:spLocks noGrp="1" noChangeArrowheads="1"/>
+          </p:cNvSpPr>
+          <p:nvPr>
+            <p:ph type="title"/>
+          </p:nvPr>
+        </p:nvSpPr>
+        <p:spPr/>
+        <p:txBody>
+          <a:bodyPr/>
+          <a:lstStyle/>
+          <a:p>
+            <a:pPr eaLnBrk="1" hangingPunct="1"/>
+            <a:r>
+              <a:rPr lang="en-US" sz="3600" dirty="0" err="1" smtClean="0"/>
+              <a:t>Xác</a:t>
+            </a:r>
+            <a:r>
+              <a:rPr lang="en-US" sz="3600" dirty="0" smtClean="0"/>
+              <a:t> </a:t>
+            </a:r>
+            <a:r>
+              <a:rPr lang="en-US" sz="3600" dirty="0" err="1" smtClean="0"/>
+              <a:t>định</a:t>
+            </a:r>
+            <a:r>
+              <a:rPr lang="en-US" sz="3600" dirty="0" smtClean="0"/>
+              <a:t> </a:t>
+            </a:r>
+            <a:r>
+              <a:rPr lang="en-US" sz="3600" i="1" dirty="0" smtClean="0"/>
+              <a:t>p</a:t>
+            </a:r>
+            <a:r>
+              <a:rPr lang="en-US" sz="3600" i="1" baseline="-25000" dirty="0" smtClean="0"/>
+              <a:t>i</a:t>
+            </a:r>
+            <a:r>
+              <a:rPr lang="en-US" sz="3600" i="1" dirty="0" smtClean="0"/>
+              <a:t> </a:t>
+            </a:r>
+            <a:r>
+              <a:rPr lang="en-US" sz="3600" i="1" dirty="0" err="1" smtClean="0"/>
+              <a:t>và</a:t>
+            </a:r>
+            <a:r>
+              <a:rPr lang="en-US" sz="3600" i="1" dirty="0" smtClean="0"/>
+              <a:t> </a:t>
+            </a:r>
+            <a:r>
+              <a:rPr lang="en-US" sz="3600" i="1" dirty="0" err="1" smtClean="0"/>
+              <a:t>r</a:t>
+            </a:r>
+            <a:r>
+              <a:rPr lang="en-US" sz="3600" i="1" baseline="-25000" dirty="0" err="1" smtClean="0"/>
+              <a:t>i</a:t>
+            </a:r>
+            <a:r>
+              <a:rPr lang="en-US" sz="3600" i="1" baseline="-25000" dirty="0" smtClean="0"/>
+              <a:t> </a:t>
+            </a:r>
+            <a:r>
+              <a:rPr lang="en-US" sz="3600" dirty="0" err="1" smtClean="0"/>
+              <a:t>nhờ</a:t>
+            </a:r>
+            <a:r>
+              <a:rPr lang="en-US" sz="3600" dirty="0" smtClean="0"/>
+              <a:t> </a:t>
+            </a:r>
+            <a:r>
+              <a:rPr lang="en-US" sz="3600" dirty="0" err="1" smtClean="0"/>
+              <a:t>vòng</a:t>
+            </a:r>
+            <a:r>
+              <a:rPr lang="en-US" sz="3600" dirty="0" smtClean="0"/>
+              <a:t> </a:t>
+            </a:r>
+            <a:r>
+              <a:rPr lang="en-US" sz="3600" dirty="0" err="1" smtClean="0"/>
+              <a:t>lặp</a:t>
+            </a:r>
+            <a:r>
+              <a:rPr lang="en-US" sz="3600" dirty="0" smtClean="0"/>
+              <a:t> </a:t>
+            </a:r>
+            <a:endParaRPr lang="en-US" sz="3600" baseline="-25000" dirty="0" smtClean="0"/>
+          </a:p>
+        </p:txBody>
+      </p:sp>
+      <p:sp>
+        <p:nvSpPr>
+          <p:cNvPr id="30724" name="Rectangle 5"/>
+          <p:cNvSpPr>
+            <a:spLocks noGrp="1" noChangeArrowheads="1"/>
+          </p:cNvSpPr>
+          <p:nvPr>
+            <p:ph type="body" idx="1"/>
+          </p:nvPr>
+        </p:nvSpPr>
+        <p:spPr>
+          <a:xfrm>
+            <a:off x="250825" y="2017712"/>
+            <a:ext cx="8704263" cy="4459287"/>
+          </a:xfrm>
+        </p:spPr>
+        <p:txBody>
+          <a:bodyPr/>
+          <a:lstStyle/>
+          <a:p>
+            <a:pPr marL="0" indent="0" eaLnBrk="1" hangingPunct="1">
+              <a:buNone/>
+            </a:pPr>
+            <a:r>
+              <a:rPr lang="en-US" sz="2800" dirty="0" err="1" smtClean="0"/>
+              <a:t>Phù</a:t>
+            </a:r>
+            <a:r>
+              <a:rPr lang="en-US" sz="2800" dirty="0" smtClean="0"/>
+              <a:t> </a:t>
+            </a:r>
+            <a:r>
+              <a:rPr lang="en-US" sz="2800" dirty="0" err="1"/>
+              <a:t>hợp</a:t>
+            </a:r>
+            <a:r>
+              <a:rPr lang="en-US" sz="2800" dirty="0"/>
+              <a:t> </a:t>
+            </a:r>
+            <a:r>
+              <a:rPr lang="en-US" sz="2800" dirty="0" err="1"/>
+              <a:t>phản</a:t>
+            </a:r>
+            <a:r>
+              <a:rPr lang="en-US" sz="2800" dirty="0"/>
+              <a:t> </a:t>
+            </a:r>
+            <a:r>
+              <a:rPr lang="en-US" sz="2800" dirty="0" err="1"/>
+              <a:t>hồi</a:t>
+            </a:r>
+            <a:r>
+              <a:rPr lang="en-US" sz="2800" dirty="0"/>
+              <a:t> </a:t>
+            </a:r>
+            <a:r>
+              <a:rPr lang="en-US" sz="2800" dirty="0" err="1"/>
+              <a:t>giả</a:t>
+            </a:r>
+            <a:r>
+              <a:rPr lang="en-US" sz="2800" dirty="0"/>
+              <a:t> </a:t>
+            </a:r>
+            <a:r>
+              <a:rPr lang="en-US" sz="2800" dirty="0" err="1"/>
+              <a:t>lập</a:t>
+            </a:r>
+            <a:endParaRPr lang="en-US" sz="2800" dirty="0"/>
+          </a:p>
+          <a:p>
+            <a:pPr eaLnBrk="1" hangingPunct="1"/>
+            <a:r>
+              <a:rPr lang="en-US" sz="2400" dirty="0" smtClean="0"/>
+              <a:t>1. </a:t>
+            </a:r>
+            <a:r>
+              <a:rPr lang="en-US" sz="2400" dirty="0" err="1" smtClean="0"/>
+              <a:t>Giả</a:t>
+            </a:r>
+            <a:r>
+              <a:rPr lang="en-US" sz="2400" dirty="0" smtClean="0"/>
+              <a:t> </a:t>
+            </a:r>
+            <a:r>
+              <a:rPr lang="en-US" sz="2400" dirty="0" err="1" smtClean="0"/>
+              <a:t>sử</a:t>
+            </a:r>
+            <a:r>
+              <a:rPr lang="en-US" sz="2400" dirty="0" smtClean="0"/>
+              <a:t> p</a:t>
+            </a:r>
+            <a:r>
+              <a:rPr lang="en-US" sz="2400" baseline="-25000" dirty="0" smtClean="0"/>
+              <a:t>i</a:t>
+            </a:r>
+            <a:r>
+              <a:rPr lang="en-US" sz="2400" dirty="0" smtClean="0"/>
+              <a:t> </a:t>
+            </a:r>
+            <a:r>
+              <a:rPr lang="en-US" sz="2400" dirty="0" err="1" smtClean="0"/>
+              <a:t>là</a:t>
+            </a:r>
+            <a:r>
+              <a:rPr lang="en-US" sz="2400" dirty="0" smtClean="0"/>
+              <a:t> hằng </a:t>
+            </a:r>
+            <a:r>
+              <a:rPr lang="en-US" sz="2400" dirty="0" err="1" smtClean="0"/>
+              <a:t>số</a:t>
+            </a:r>
+            <a:r>
+              <a:rPr lang="en-US" sz="2400" dirty="0" smtClean="0"/>
+              <a:t> </a:t>
+            </a:r>
+            <a:r>
+              <a:rPr lang="en-US" sz="2400" dirty="0" err="1" smtClean="0"/>
+              <a:t>với</a:t>
+            </a:r>
+            <a:r>
+              <a:rPr lang="en-US" sz="2400" dirty="0" smtClean="0"/>
+              <a:t> </a:t>
+            </a:r>
+            <a:r>
+              <a:rPr lang="en-US" sz="2400" dirty="0" err="1" smtClean="0"/>
+              <a:t>mọi</a:t>
+            </a:r>
+            <a:r>
+              <a:rPr lang="en-US" sz="2400" dirty="0" smtClean="0"/>
+              <a:t> x</a:t>
+            </a:r>
+            <a:r>
+              <a:rPr lang="en-US" sz="2400" baseline="-25000" dirty="0" smtClean="0"/>
+              <a:t>i</a:t>
+            </a:r>
+            <a:r>
+              <a:rPr lang="en-US" sz="2400" dirty="0" smtClean="0"/>
+              <a:t> </a:t>
+            </a:r>
+            <a:r>
+              <a:rPr lang="en-US" sz="2400" dirty="0" err="1" smtClean="0"/>
+              <a:t>trong</a:t>
+            </a:r>
+            <a:r>
+              <a:rPr lang="en-US" sz="2400" dirty="0" smtClean="0"/>
+              <a:t> </a:t>
+            </a:r>
+            <a:r>
+              <a:rPr lang="en-US" sz="2400" dirty="0" err="1" smtClean="0"/>
+              <a:t>truy</a:t>
+            </a:r>
+            <a:r>
+              <a:rPr lang="en-US" sz="2400" dirty="0" smtClean="0"/>
+              <a:t> </a:t>
+            </a:r>
+            <a:r>
+              <a:rPr lang="en-US" sz="2400" dirty="0" err="1" smtClean="0"/>
+              <a:t>vấn</a:t>
+            </a:r>
+            <a:r>
+              <a:rPr lang="en-US" sz="2400" dirty="0" smtClean="0"/>
+              <a:t>. </a:t>
+            </a:r>
+            <a:r>
+              <a:rPr lang="en-US" sz="2400" i="1" dirty="0" err="1" smtClean="0"/>
+              <a:t>Ví</a:t>
+            </a:r>
+            <a:r>
+              <a:rPr lang="en-US" sz="2400" i="1" dirty="0" smtClean="0"/>
+              <a:t> </a:t>
+            </a:r>
+            <a:r>
+              <a:rPr lang="en-US" sz="2400" i="1" dirty="0" err="1" smtClean="0"/>
+              <a:t>dụ</a:t>
+            </a:r>
+            <a:r>
+              <a:rPr lang="en-US" sz="2400" i="1" dirty="0" smtClean="0"/>
+              <a:t>, p</a:t>
+            </a:r>
+            <a:r>
+              <a:rPr lang="en-US" sz="2400" i="1" baseline="-25000" dirty="0" smtClean="0"/>
+              <a:t>i</a:t>
+            </a:r>
+            <a:r>
+              <a:rPr lang="en-US" sz="2400" dirty="0" smtClean="0"/>
+              <a:t> = 0.5 </a:t>
+            </a:r>
+            <a:r>
+              <a:rPr lang="en-US" sz="2400" dirty="0" err="1" smtClean="0"/>
+              <a:t>với</a:t>
+            </a:r>
+            <a:r>
+              <a:rPr lang="en-US" sz="2400" dirty="0" smtClean="0"/>
+              <a:t> </a:t>
+            </a:r>
+            <a:r>
+              <a:rPr lang="en-US" sz="2400" dirty="0" err="1" smtClean="0"/>
+              <a:t>văn</a:t>
+            </a:r>
+            <a:r>
+              <a:rPr lang="en-US" sz="2400" dirty="0" smtClean="0"/>
+              <a:t> </a:t>
+            </a:r>
+            <a:r>
+              <a:rPr lang="en-US" sz="2400" dirty="0" err="1" smtClean="0"/>
+              <a:t>bản</a:t>
+            </a:r>
+            <a:r>
+              <a:rPr lang="en-US" sz="2400" dirty="0" smtClean="0"/>
+              <a:t> </a:t>
+            </a:r>
+            <a:r>
+              <a:rPr lang="en-US" sz="2400" dirty="0" err="1" smtClean="0"/>
+              <a:t>bất</a:t>
+            </a:r>
+            <a:r>
+              <a:rPr lang="en-US" sz="2400" dirty="0" smtClean="0"/>
+              <a:t> </a:t>
+            </a:r>
+            <a:r>
+              <a:rPr lang="en-US" sz="2400" dirty="0" err="1" smtClean="0"/>
+              <a:t>kỳ</a:t>
+            </a:r>
+            <a:endParaRPr lang="en-US" sz="2400" dirty="0" smtClean="0"/>
+          </a:p>
+          <a:p>
+            <a:pPr algn="just" eaLnBrk="1" hangingPunct="1"/>
+            <a:r>
+              <a:rPr lang="en-US" sz="2400" dirty="0" smtClean="0"/>
+              <a:t>2. </a:t>
+            </a:r>
+            <a:r>
+              <a:rPr lang="en-US" sz="2400" dirty="0" err="1" smtClean="0"/>
+              <a:t>Giả</a:t>
+            </a:r>
+            <a:r>
+              <a:rPr lang="en-US" sz="2400" dirty="0" smtClean="0"/>
+              <a:t> </a:t>
+            </a:r>
+            <a:r>
+              <a:rPr lang="en-US" sz="2400" dirty="0" err="1" smtClean="0"/>
+              <a:t>sử</a:t>
+            </a:r>
+            <a:r>
+              <a:rPr lang="en-US" sz="2400" dirty="0" smtClean="0"/>
+              <a:t> </a:t>
+            </a:r>
+            <a:r>
+              <a:rPr lang="en-US" sz="2400" dirty="0" err="1" smtClean="0"/>
+              <a:t>tập</a:t>
+            </a:r>
+            <a:r>
+              <a:rPr lang="en-US" sz="2400" dirty="0" smtClean="0"/>
+              <a:t> V</a:t>
+            </a:r>
+            <a:r>
+              <a:rPr lang="en-US" sz="2000" dirty="0" smtClean="0"/>
+              <a:t> </a:t>
+            </a:r>
+            <a:r>
+              <a:rPr lang="en-US" sz="2400" dirty="0" err="1" smtClean="0"/>
+              <a:t>với</a:t>
+            </a:r>
+            <a:r>
+              <a:rPr lang="en-US" sz="2400" dirty="0" smtClean="0"/>
+              <a:t> </a:t>
+            </a:r>
+            <a:r>
+              <a:rPr lang="en-US" sz="2400" dirty="0" err="1" smtClean="0"/>
+              <a:t>những</a:t>
+            </a:r>
+            <a:r>
+              <a:rPr lang="en-US" sz="2400" dirty="0" smtClean="0"/>
+              <a:t> </a:t>
+            </a:r>
+            <a:r>
+              <a:rPr lang="en-US" sz="2400" dirty="0" err="1" smtClean="0"/>
+              <a:t>văn</a:t>
+            </a:r>
+            <a:r>
+              <a:rPr lang="en-US" sz="2400" dirty="0" smtClean="0"/>
+              <a:t> </a:t>
+            </a:r>
+            <a:r>
+              <a:rPr lang="en-US" sz="2400" dirty="0" err="1" smtClean="0"/>
+              <a:t>bản</a:t>
+            </a:r>
+            <a:r>
+              <a:rPr lang="en-US" sz="2400" dirty="0" smtClean="0"/>
+              <a:t> </a:t>
+            </a:r>
+            <a:r>
+              <a:rPr lang="en-US" sz="2400" dirty="0" err="1" smtClean="0"/>
+              <a:t>được</a:t>
+            </a:r>
+            <a:r>
+              <a:rPr lang="en-US" sz="2400" dirty="0" smtClean="0"/>
+              <a:t> </a:t>
+            </a:r>
+            <a:r>
+              <a:rPr lang="en-US" sz="2400" dirty="0" err="1" smtClean="0"/>
+              <a:t>xếp</a:t>
+            </a:r>
+            <a:r>
+              <a:rPr lang="en-US" sz="2400" dirty="0" smtClean="0"/>
+              <a:t> </a:t>
+            </a:r>
+            <a:r>
+              <a:rPr lang="en-US" sz="2400" dirty="0" err="1" smtClean="0"/>
+              <a:t>hạng</a:t>
+            </a:r>
+            <a:r>
+              <a:rPr lang="en-US" sz="2400" dirty="0" smtClean="0"/>
+              <a:t> </a:t>
+            </a:r>
+            <a:r>
+              <a:rPr lang="en-US" sz="2400" dirty="0" err="1" smtClean="0"/>
+              <a:t>cao</a:t>
+            </a:r>
+            <a:r>
+              <a:rPr lang="en-US" sz="2400" dirty="0" smtClean="0"/>
+              <a:t> </a:t>
+            </a:r>
+            <a:r>
+              <a:rPr lang="en-US" sz="2400" dirty="0" err="1" smtClean="0"/>
+              <a:t>nhất</a:t>
+            </a:r>
+            <a:r>
+              <a:rPr lang="en-US" sz="2400" dirty="0" smtClean="0"/>
+              <a:t> </a:t>
+            </a:r>
+            <a:r>
+              <a:rPr lang="en-US" sz="2400" dirty="0" err="1" smtClean="0"/>
+              <a:t>theo</a:t>
+            </a:r>
+            <a:r>
+              <a:rPr lang="en-US" sz="2400" dirty="0" smtClean="0"/>
+              <a:t> </a:t>
+            </a:r>
+            <a:r>
+              <a:rPr lang="en-US" sz="2400" dirty="0" err="1" smtClean="0"/>
+              <a:t>mô</a:t>
+            </a:r>
+            <a:r>
+              <a:rPr lang="en-US" sz="2400" dirty="0" smtClean="0"/>
+              <a:t> </a:t>
+            </a:r>
+            <a:r>
+              <a:rPr lang="en-US" sz="2400" dirty="0" err="1" smtClean="0"/>
+              <a:t>hình</a:t>
+            </a:r>
+            <a:r>
+              <a:rPr lang="en-US" sz="2400" dirty="0" smtClean="0"/>
+              <a:t> </a:t>
+            </a:r>
+            <a:r>
+              <a:rPr lang="en-US" sz="2400" dirty="0" err="1" smtClean="0"/>
+              <a:t>này</a:t>
+            </a:r>
+            <a:r>
+              <a:rPr lang="en-US" sz="2400" dirty="0" smtClean="0"/>
+              <a:t> </a:t>
+            </a:r>
+            <a:r>
+              <a:rPr lang="en-US" sz="2400" dirty="0" err="1" smtClean="0"/>
+              <a:t>là</a:t>
+            </a:r>
+            <a:r>
+              <a:rPr lang="en-US" sz="2400" dirty="0" smtClean="0"/>
+              <a:t> </a:t>
+            </a:r>
+            <a:r>
+              <a:rPr lang="en-US" sz="2400" dirty="0" err="1" smtClean="0"/>
+              <a:t>những</a:t>
+            </a:r>
+            <a:r>
+              <a:rPr lang="en-US" sz="2400" dirty="0" smtClean="0"/>
+              <a:t> </a:t>
+            </a:r>
+            <a:r>
+              <a:rPr lang="en-US" sz="2400" dirty="0" err="1" smtClean="0"/>
+              <a:t>văn</a:t>
+            </a:r>
+            <a:r>
+              <a:rPr lang="en-US" sz="2400" dirty="0" smtClean="0"/>
+              <a:t> </a:t>
+            </a:r>
+            <a:r>
+              <a:rPr lang="en-US" sz="2400" dirty="0" err="1" smtClean="0"/>
+              <a:t>bản</a:t>
+            </a:r>
+            <a:r>
+              <a:rPr lang="en-US" sz="2400" dirty="0" smtClean="0"/>
+              <a:t> </a:t>
+            </a:r>
+            <a:r>
+              <a:rPr lang="en-US" sz="2400" dirty="0" err="1" smtClean="0"/>
+              <a:t>phù</a:t>
+            </a:r>
+            <a:r>
+              <a:rPr lang="en-US" sz="2400" dirty="0" smtClean="0"/>
+              <a:t> </a:t>
+            </a:r>
+            <a:r>
+              <a:rPr lang="en-US" sz="2400" dirty="0" err="1" smtClean="0"/>
+              <a:t>hợp</a:t>
+            </a:r>
+            <a:r>
+              <a:rPr lang="en-US" sz="2400" dirty="0" smtClean="0"/>
+              <a:t>.</a:t>
+            </a:r>
+          </a:p>
+          <a:p>
+            <a:pPr algn="just" eaLnBrk="1" hangingPunct="1"/>
+            <a:r>
+              <a:rPr lang="en-US" sz="2400" dirty="0" smtClean="0"/>
+              <a:t>3.</a:t>
+            </a:r>
+            <a:r>
+              <a:rPr lang="en-US" sz="2800" dirty="0" smtClean="0"/>
+              <a:t> </a:t>
+            </a:r>
+            <a:r>
+              <a:rPr lang="en-US" sz="2400" dirty="0" err="1" smtClean="0"/>
+              <a:t>Cần</a:t>
+            </a:r>
+            <a:r>
+              <a:rPr lang="en-US" sz="2400" dirty="0" smtClean="0"/>
+              <a:t> </a:t>
+            </a:r>
+            <a:r>
+              <a:rPr lang="en-US" sz="2400" dirty="0" err="1" smtClean="0"/>
+              <a:t>xác</a:t>
+            </a:r>
+            <a:r>
+              <a:rPr lang="en-US" sz="2400" dirty="0" smtClean="0"/>
+              <a:t> </a:t>
+            </a:r>
+            <a:r>
+              <a:rPr lang="en-US" sz="2400" dirty="0" err="1" smtClean="0"/>
+              <a:t>định</a:t>
+            </a:r>
+            <a:r>
+              <a:rPr lang="en-US" sz="2400" dirty="0" smtClean="0"/>
+              <a:t> </a:t>
+            </a:r>
+            <a:r>
+              <a:rPr lang="en-US" sz="2400" dirty="0" err="1" smtClean="0"/>
+              <a:t>lại</a:t>
+            </a:r>
+            <a:r>
+              <a:rPr lang="en-US" sz="2400" dirty="0" smtClean="0"/>
+              <a:t> </a:t>
+            </a:r>
+            <a:r>
+              <a:rPr lang="en-US" sz="2400" i="1" dirty="0" smtClean="0"/>
+              <a:t>p</a:t>
+            </a:r>
+            <a:r>
+              <a:rPr lang="en-US" sz="2400" i="1" baseline="-25000" dirty="0" smtClean="0"/>
+              <a:t>i</a:t>
+            </a:r>
+            <a:r>
+              <a:rPr lang="en-US" sz="2400" dirty="0" smtClean="0"/>
+              <a:t> </a:t>
+            </a:r>
+            <a:r>
+              <a:rPr lang="en-US" sz="2400" dirty="0" err="1" smtClean="0"/>
+              <a:t>và</a:t>
+            </a:r>
+            <a:r>
+              <a:rPr lang="en-US" sz="2400" dirty="0" smtClean="0"/>
+              <a:t> </a:t>
+            </a:r>
+            <a:r>
+              <a:rPr lang="en-US" sz="2400" i="1" dirty="0" err="1" smtClean="0"/>
+              <a:t>r</a:t>
+            </a:r>
+            <a:r>
+              <a:rPr lang="en-US" sz="2400" i="1" baseline="-25000" dirty="0" err="1" smtClean="0"/>
+              <a:t>i</a:t>
+            </a:r>
+            <a:r>
+              <a:rPr lang="en-US" sz="2400" dirty="0" smtClean="0"/>
+              <a:t>, </a:t>
+            </a:r>
+            <a:r>
+              <a:rPr lang="en-US" sz="2400" dirty="0" err="1" smtClean="0"/>
+              <a:t>sử</a:t>
+            </a:r>
+            <a:r>
+              <a:rPr lang="en-US" sz="2400" dirty="0" smtClean="0"/>
+              <a:t> </a:t>
+            </a:r>
+            <a:r>
+              <a:rPr lang="en-US" sz="2400" dirty="0" err="1" smtClean="0"/>
+              <a:t>dụng</a:t>
+            </a:r>
+            <a:r>
+              <a:rPr lang="en-US" sz="2400" dirty="0" smtClean="0"/>
+              <a:t> </a:t>
+            </a:r>
+            <a:r>
+              <a:rPr lang="en-US" sz="2400" dirty="0" err="1" smtClean="0"/>
+              <a:t>phân</a:t>
+            </a:r>
+            <a:r>
+              <a:rPr lang="en-US" sz="2400" dirty="0" smtClean="0"/>
+              <a:t> </a:t>
+            </a:r>
+            <a:r>
+              <a:rPr lang="en-US" sz="2400" dirty="0" err="1" smtClean="0"/>
+              <a:t>bố</a:t>
+            </a:r>
+            <a:r>
+              <a:rPr lang="en-US" sz="2400" dirty="0" smtClean="0"/>
+              <a:t> </a:t>
+            </a:r>
+            <a:r>
+              <a:rPr lang="en-US" sz="2400" dirty="0" err="1" smtClean="0"/>
+              <a:t>từ</a:t>
+            </a:r>
+            <a:r>
+              <a:rPr lang="en-US" sz="2400" dirty="0" smtClean="0"/>
+              <a:t> </a:t>
+            </a:r>
+            <a:r>
+              <a:rPr lang="en-US" sz="2400" dirty="0" err="1" smtClean="0"/>
+              <a:t>trong</a:t>
+            </a:r>
+            <a:r>
+              <a:rPr lang="en-US" sz="2400" dirty="0" smtClean="0"/>
+              <a:t> V. </a:t>
+            </a:r>
+            <a:r>
+              <a:rPr lang="en-US" sz="2400" dirty="0" err="1" smtClean="0"/>
+              <a:t>Đặt</a:t>
+            </a:r>
+            <a:r>
+              <a:rPr lang="en-US" sz="2400" dirty="0" smtClean="0"/>
+              <a:t> V</a:t>
+            </a:r>
+            <a:r>
+              <a:rPr lang="en-US" sz="2400" baseline="-25000" dirty="0" smtClean="0"/>
+              <a:t>i</a:t>
+            </a:r>
+            <a:r>
+              <a:rPr lang="en-US" sz="2400" dirty="0" smtClean="0"/>
+              <a:t> </a:t>
+            </a:r>
+            <a:r>
+              <a:rPr lang="en-US" sz="2400" dirty="0" err="1" smtClean="0"/>
+              <a:t>là</a:t>
+            </a:r>
+            <a:r>
+              <a:rPr lang="en-US" sz="2400" dirty="0" smtClean="0"/>
+              <a:t> </a:t>
+            </a:r>
+            <a:r>
+              <a:rPr lang="en-US" sz="2400" dirty="0" err="1" smtClean="0"/>
+              <a:t>tập</a:t>
+            </a:r>
+            <a:r>
+              <a:rPr lang="en-US" sz="2400" dirty="0" smtClean="0"/>
+              <a:t> 	</a:t>
+            </a:r>
+            <a:r>
+              <a:rPr lang="en-US" sz="2400" dirty="0" err="1" smtClean="0"/>
+              <a:t>văn</a:t>
+            </a:r>
+            <a:r>
+              <a:rPr lang="en-US" sz="2400" dirty="0" smtClean="0"/>
+              <a:t> </a:t>
+            </a:r>
+            <a:r>
+              <a:rPr lang="en-US" sz="2400" dirty="0" err="1" smtClean="0"/>
+              <a:t>bản</a:t>
+            </a:r>
+            <a:r>
+              <a:rPr lang="en-US" sz="2400" dirty="0" smtClean="0"/>
+              <a:t> </a:t>
+            </a:r>
+            <a:r>
+              <a:rPr lang="en-US" sz="2400" dirty="0" err="1" smtClean="0"/>
+              <a:t>có</a:t>
+            </a:r>
+            <a:r>
+              <a:rPr lang="en-US" sz="2400" dirty="0" smtClean="0"/>
+              <a:t> 	</a:t>
+            </a:r>
+            <a:r>
+              <a:rPr lang="en-US" sz="2400" dirty="0" err="1" smtClean="0"/>
+              <a:t>chứa</a:t>
+            </a:r>
+            <a:r>
+              <a:rPr lang="en-US" sz="2400" dirty="0" smtClean="0"/>
+              <a:t> </a:t>
+            </a:r>
+            <a:r>
+              <a:rPr lang="en-US" sz="2400" i="1" dirty="0" smtClean="0"/>
+              <a:t>x</a:t>
+            </a:r>
+            <a:r>
+              <a:rPr lang="en-US" sz="2400" i="1" baseline="-25000" dirty="0" smtClean="0"/>
+              <a:t>i</a:t>
+            </a:r>
+            <a:r>
+              <a:rPr lang="en-US" sz="2400" dirty="0" smtClean="0"/>
+              <a:t> , </a:t>
+            </a:r>
+            <a:r>
+              <a:rPr lang="en-US" sz="2400" dirty="0" err="1" smtClean="0"/>
+              <a:t>chúng</a:t>
+            </a:r>
+            <a:r>
+              <a:rPr lang="en-US" sz="2400" dirty="0" smtClean="0"/>
+              <a:t> ta </a:t>
+            </a:r>
+            <a:r>
+              <a:rPr lang="en-US" sz="2400" dirty="0" err="1" smtClean="0"/>
+              <a:t>có</a:t>
+            </a:r>
+            <a:r>
+              <a:rPr lang="en-US" sz="2400" dirty="0" smtClean="0"/>
+              <a:t>  </a:t>
+            </a:r>
+            <a:r>
+              <a:rPr lang="en-US" sz="2400" i="1" dirty="0" smtClean="0"/>
+              <a:t>p</a:t>
+            </a:r>
+            <a:r>
+              <a:rPr lang="en-US" sz="2400" i="1" baseline="-25000" dirty="0" smtClean="0"/>
+              <a:t>i</a:t>
+            </a:r>
+            <a:r>
+              <a:rPr lang="en-US" sz="2400" dirty="0" smtClean="0"/>
+              <a:t> = |V</a:t>
+            </a:r>
+            <a:r>
+              <a:rPr lang="en-US" sz="2400" baseline="-25000" dirty="0" smtClean="0"/>
+              <a:t>i</a:t>
+            </a:r>
+            <a:r>
+              <a:rPr lang="en-US" sz="2400" dirty="0" smtClean="0"/>
+              <a:t>| / |V|</a:t>
+            </a:r>
+          </a:p>
+          <a:p>
+            <a:pPr algn="just" eaLnBrk="1" hangingPunct="1"/>
+            <a:r>
+              <a:rPr lang="en-US" sz="2400" dirty="0" smtClean="0"/>
+              <a:t>4. </a:t>
+            </a:r>
+            <a:r>
+              <a:rPr lang="en-US" sz="2400" dirty="0" err="1" smtClean="0"/>
+              <a:t>Giả</a:t>
+            </a:r>
+            <a:r>
+              <a:rPr lang="en-US" sz="2400" dirty="0" smtClean="0"/>
+              <a:t> </a:t>
+            </a:r>
+            <a:r>
+              <a:rPr lang="en-US" sz="2400" dirty="0" err="1" smtClean="0"/>
+              <a:t>sử</a:t>
+            </a:r>
+            <a:r>
+              <a:rPr lang="en-US" sz="2400" dirty="0" smtClean="0"/>
+              <a:t> </a:t>
+            </a:r>
+            <a:r>
+              <a:rPr lang="en-US" sz="2400" dirty="0" err="1" smtClean="0"/>
+              <a:t>không</a:t>
+            </a:r>
+            <a:r>
+              <a:rPr lang="en-US" sz="2400" dirty="0" smtClean="0"/>
+              <a:t> </a:t>
+            </a:r>
+            <a:r>
+              <a:rPr lang="en-US" sz="2400" dirty="0" err="1" smtClean="0"/>
+              <a:t>được</a:t>
+            </a:r>
+            <a:r>
+              <a:rPr lang="en-US" sz="2400" dirty="0" smtClean="0"/>
+              <a:t> </a:t>
+            </a:r>
+            <a:r>
+              <a:rPr lang="en-US" sz="2400" dirty="0" err="1" smtClean="0"/>
+              <a:t>trả</a:t>
+            </a:r>
+            <a:r>
+              <a:rPr lang="en-US" sz="2400" dirty="0" smtClean="0"/>
+              <a:t> </a:t>
+            </a:r>
+            <a:r>
+              <a:rPr lang="en-US" sz="2400" dirty="0" err="1" smtClean="0"/>
+              <a:t>về</a:t>
+            </a:r>
+            <a:r>
+              <a:rPr lang="en-US" sz="2400" dirty="0" smtClean="0"/>
+              <a:t> </a:t>
+            </a:r>
+            <a:r>
+              <a:rPr lang="en-US" sz="2400" dirty="0" err="1" smtClean="0"/>
+              <a:t>đồng</a:t>
+            </a:r>
+            <a:r>
+              <a:rPr lang="en-US" sz="2400" dirty="0" smtClean="0"/>
+              <a:t> </a:t>
+            </a:r>
+            <a:r>
+              <a:rPr lang="en-US" sz="2400" dirty="0" err="1" smtClean="0"/>
+              <a:t>nghĩa</a:t>
+            </a:r>
+            <a:r>
+              <a:rPr lang="en-US" sz="2400" dirty="0" smtClean="0"/>
+              <a:t> </a:t>
+            </a:r>
+            <a:r>
+              <a:rPr lang="en-US" sz="2400" dirty="0" err="1" smtClean="0"/>
+              <a:t>với</a:t>
+            </a:r>
+            <a:r>
+              <a:rPr lang="en-US" sz="2400" dirty="0" smtClean="0"/>
+              <a:t> </a:t>
+            </a:r>
+            <a:r>
+              <a:rPr lang="en-US" sz="2400" dirty="0" err="1" smtClean="0"/>
+              <a:t>không</a:t>
+            </a:r>
+            <a:r>
+              <a:rPr lang="en-US" sz="2400" dirty="0" smtClean="0"/>
+              <a:t> </a:t>
+            </a:r>
+            <a:r>
+              <a:rPr lang="en-US" sz="2400" dirty="0" err="1" smtClean="0"/>
+              <a:t>phù</a:t>
+            </a:r>
+            <a:r>
+              <a:rPr lang="en-US" sz="2400" dirty="0" smtClean="0"/>
+              <a:t> </a:t>
+            </a:r>
+            <a:r>
+              <a:rPr lang="en-US" sz="2400" dirty="0" err="1" smtClean="0"/>
+              <a:t>hợp</a:t>
+            </a:r>
+            <a:r>
+              <a:rPr lang="en-US" sz="2400" dirty="0" smtClean="0"/>
+              <a:t>, </a:t>
+            </a:r>
+            <a:r>
+              <a:rPr lang="en-US" sz="2800" i="1" dirty="0" err="1" smtClean="0"/>
+              <a:t>r</a:t>
+            </a:r>
+            <a:r>
+              <a:rPr lang="en-US" sz="2800" i="1" baseline="-25000" dirty="0" err="1" smtClean="0"/>
+              <a:t>i</a:t>
+            </a:r>
+            <a:r>
+              <a:rPr lang="en-US" sz="2800" dirty="0" smtClean="0"/>
+              <a:t>  = (</a:t>
+            </a:r>
+            <a:r>
+              <a:rPr lang="en-US" sz="2800" dirty="0" err="1" smtClean="0"/>
+              <a:t>n</a:t>
+            </a:r>
+            <a:r>
+              <a:rPr lang="en-US" sz="2800" baseline="-25000" dirty="0" err="1" smtClean="0"/>
+              <a:t>i</a:t>
+            </a:r>
+            <a:r>
+              <a:rPr lang="en-US" sz="2800" dirty="0" smtClean="0"/>
+              <a:t> – |V</a:t>
+            </a:r>
+            <a:r>
+              <a:rPr lang="en-US" sz="2800" baseline="-25000" dirty="0" smtClean="0"/>
+              <a:t>i</a:t>
+            </a:r>
+            <a:r>
+              <a:rPr lang="en-US" sz="2800" dirty="0" smtClean="0"/>
+              <a:t>|) / (N – |V|)</a:t>
+            </a:r>
+            <a:endParaRPr lang="en-US" sz="3600" dirty="0" smtClean="0"/>
+          </a:p>
+          <a:p>
+            <a:pPr algn="just" eaLnBrk="1" hangingPunct="1"/>
+            <a:r>
+              <a:rPr lang="en-US" sz="2400" dirty="0" smtClean="0"/>
+              <a:t>5. </a:t>
+            </a:r>
+            <a:r>
+              <a:rPr lang="en-US" sz="2400" dirty="0" err="1" smtClean="0"/>
+              <a:t>Lặp</a:t>
+            </a:r>
+            <a:r>
+              <a:rPr lang="en-US" sz="2400" dirty="0" smtClean="0"/>
+              <a:t> </a:t>
+            </a:r>
+            <a:r>
+              <a:rPr lang="en-US" sz="2400" dirty="0" err="1" smtClean="0"/>
+              <a:t>các</a:t>
+            </a:r>
+            <a:r>
+              <a:rPr lang="en-US" sz="2400" dirty="0" smtClean="0"/>
+              <a:t> </a:t>
+            </a:r>
+            <a:r>
+              <a:rPr lang="en-US" sz="2400" dirty="0" err="1" smtClean="0"/>
+              <a:t>bước</a:t>
+            </a:r>
+            <a:r>
+              <a:rPr lang="en-US" sz="2400" dirty="0" smtClean="0"/>
+              <a:t> 2-4 </a:t>
+            </a:r>
+            <a:r>
+              <a:rPr lang="en-US" sz="2400" dirty="0" err="1" smtClean="0"/>
+              <a:t>cho</a:t>
+            </a:r>
+            <a:r>
+              <a:rPr lang="en-US" sz="2400" dirty="0" smtClean="0"/>
+              <a:t> </a:t>
+            </a:r>
+            <a:r>
+              <a:rPr lang="en-US" sz="2400" dirty="0" err="1" smtClean="0"/>
+              <a:t>tới</a:t>
+            </a:r>
+            <a:r>
+              <a:rPr lang="en-US" sz="2400" dirty="0" smtClean="0"/>
+              <a:t> </a:t>
+            </a:r>
+            <a:r>
+              <a:rPr lang="en-US" sz="2400" dirty="0" err="1" smtClean="0"/>
+              <a:t>khi</a:t>
+            </a:r>
+            <a:r>
+              <a:rPr lang="en-US" sz="2400" dirty="0" smtClean="0"/>
+              <a:t> </a:t>
+            </a:r>
+            <a:r>
+              <a:rPr lang="en-US" sz="2400" dirty="0" err="1" smtClean="0"/>
+              <a:t>hội</a:t>
+            </a:r>
+            <a:r>
+              <a:rPr lang="en-US" sz="2400" dirty="0" smtClean="0"/>
+              <a:t> </a:t>
+            </a:r>
+            <a:r>
+              <a:rPr lang="en-US" sz="2400" dirty="0" err="1" smtClean="0"/>
+              <a:t>tụ</a:t>
+            </a:r>
+            <a:r>
+              <a:rPr lang="en-US" sz="2400" dirty="0" smtClean="0"/>
+              <a:t> </a:t>
+            </a:r>
+            <a:r>
+              <a:rPr lang="en-US" sz="2400" dirty="0" err="1" smtClean="0"/>
+              <a:t>và</a:t>
+            </a:r>
+            <a:r>
+              <a:rPr lang="en-US" sz="2400" dirty="0" smtClean="0"/>
+              <a:t> </a:t>
+            </a:r>
+            <a:r>
+              <a:rPr lang="en-US" sz="2400" dirty="0" err="1" smtClean="0"/>
+              <a:t>trả</a:t>
+            </a:r>
+            <a:r>
+              <a:rPr lang="en-US" sz="2400" dirty="0" smtClean="0"/>
+              <a:t> </a:t>
+            </a:r>
+            <a:r>
+              <a:rPr lang="en-US" sz="2400" dirty="0" err="1" smtClean="0"/>
+              <a:t>về</a:t>
+            </a:r>
+            <a:r>
+              <a:rPr lang="en-US" sz="2400" dirty="0" smtClean="0"/>
+              <a:t> </a:t>
+            </a:r>
+            <a:r>
+              <a:rPr lang="en-US" sz="2400" dirty="0" err="1" smtClean="0"/>
+              <a:t>kết</a:t>
+            </a:r>
+            <a:r>
+              <a:rPr lang="en-US" sz="2400" dirty="0" smtClean="0"/>
+              <a:t> </a:t>
+            </a:r>
+            <a:r>
+              <a:rPr lang="en-US" sz="2400" dirty="0" err="1" smtClean="0"/>
+              <a:t>quả</a:t>
+            </a:r>
+            <a:r>
+              <a:rPr lang="en-US" sz="2400" dirty="0" smtClean="0"/>
+              <a:t>.</a:t>
+            </a:r>
+          </a:p>
+          <a:p>
+            <a:pPr eaLnBrk="1" hangingPunct="1"/>
+            <a:endParaRPr lang="vi-VN" sz="2400" dirty="0" smtClean="0"/>
+          </a:p>
+        </p:txBody>
+      </p:sp>
+      <p:sp>
+        <p:nvSpPr>
+          <p:cNvPr id="2" name="Slide Number Placeholder 1"/>
+          <p:cNvSpPr>
+            <a:spLocks noGrp="1"/>
+          </p:cNvSpPr>
+          <p:nvPr>
+            <p:ph type="sldNum" sz="quarter" idx="12"/>
+          </p:nvPr>
+        </p:nvSpPr>
+        <p:spPr/>
+        <p:txBody>
+          <a:bodyPr/>
+          <a:lstStyle/>
+          <a:p>
+            <a:pPr>
+              <a:defRPr/>
+            </a:pPr>
+            <a:fld id="{A81E07A1-38DA-436E-9EB2-1E501CB9FFA7}" type="slidenum">
+              <a:rPr lang="vi-VN" smtClean="0"/>
+              <a:pPr>
+                <a:defRPr/>
+              </a:pPr>
+              <a:t>26</a:t>
+            </a:fld>
+            <a:endParaRPr lang="vi-VN" dirty="0"/>
+          </a:p>
+        </p:txBody>
+      </p:sp>
+    </p:spTree>
+  </p:cSld>
+  <p:clrMapOvr>
+    <a:masterClrMapping/>
+  </p:clrMapOvr>
+  <p:timing>
+    <p:tnLst>
+      <p:par>
+        <p:cTn id="1" dur="indefinite" restart="never" nodeType="tmRoot"/>
+      </p:par>
+    </p:tnLst>
+  </p:timing>
+</p:sld>
+</file>
+
+<file path=ppt/slides/slide27.xml><?xml version="1.0" encoding="utf-8"?>
+<p:sld xmlns:a="http://schemas.openxmlformats.org/drawingml/2006/main" xmlns:r="http://schemas.openxmlformats.org/officeDocument/2006/relationships" xmlns:p="http://schemas.openxmlformats.org/presentationml/2006/main">
+  <p:cSld>
+    <p:spTree>
+      <p:nvGrpSpPr>
+        <p:cNvPr id="1" name=""/>
+        <p:cNvGrpSpPr/>
+        <p:nvPr/>
+      </p:nvGrpSpPr>
+      <p:grpSpPr>
+        <a:xfrm>
+          <a:off x="0" y="0"/>
+          <a:ext cx="0" cy="0"/>
+          <a:chOff x="0" y="0"/>
+          <a:chExt cx="0" cy="0"/>
+        </a:xfrm>
+      </p:grpSpPr>
+      <p:sp>
+        <p:nvSpPr>
           <p:cNvPr id="29698" name="Rectangle 2"/>
           <p:cNvSpPr>
             <a:spLocks noGrp="1" noChangeArrowheads="1"/>
@@ -25478,7 +26562,7 @@
           <a:graphicData uri="http://schemas.openxmlformats.org/presentationml/2006/ole">
             <mc:AlternateContent xmlns:mc="http://schemas.openxmlformats.org/markup-compatibility/2006">
               <mc:Choice xmlns:v="urn:schemas-microsoft-com:vml" Requires="v">
-                <p:oleObj spid="_x0000_s29878" name="Формула" r:id="rId4" imgW="2273300" imgH="419100" progId="Equation.3">
+                <p:oleObj spid="_x0000_s29886" name="Формула" r:id="rId4" imgW="2273300" imgH="419100" progId="Equation.3">
                   <p:embed/>
                 </p:oleObj>
               </mc:Choice>
@@ -25568,1062 +26652,9 @@
               <a:pPr>
                 <a:defRPr/>
               </a:pPr>
-              <a:t>26</a:t>
+              <a:t>27</a:t>
             </a:fld>
             <a:endParaRPr lang="vi-VN"/>
-          </a:p>
-        </p:txBody>
-      </p:sp>
-    </p:spTree>
-  </p:cSld>
-  <p:clrMapOvr>
-    <a:masterClrMapping/>
-  </p:clrMapOvr>
-  <p:timing>
-    <p:tnLst>
-      <p:par>
-        <p:cTn id="1" dur="indefinite" restart="never" nodeType="tmRoot"/>
-      </p:par>
-    </p:tnLst>
-  </p:timing>
-</p:sld>
-</file>
-
-<file path=ppt/slides/slide27.xml><?xml version="1.0" encoding="utf-8"?>
-<p:sld xmlns:a="http://schemas.openxmlformats.org/drawingml/2006/main" xmlns:r="http://schemas.openxmlformats.org/officeDocument/2006/relationships" xmlns:p="http://schemas.openxmlformats.org/presentationml/2006/main">
-  <p:cSld>
-    <p:spTree>
-      <p:nvGrpSpPr>
-        <p:cNvPr id="1" name=""/>
-        <p:cNvGrpSpPr/>
-        <p:nvPr/>
-      </p:nvGrpSpPr>
-      <p:grpSpPr>
-        <a:xfrm>
-          <a:off x="0" y="0"/>
-          <a:ext cx="0" cy="0"/>
-          <a:chOff x="0" y="0"/>
-          <a:chExt cx="0" cy="0"/>
-        </a:xfrm>
-      </p:grpSpPr>
-      <p:sp>
-        <p:nvSpPr>
-          <p:cNvPr id="30723" name="Rectangle 7"/>
-          <p:cNvSpPr>
-            <a:spLocks noGrp="1" noChangeArrowheads="1"/>
-          </p:cNvSpPr>
-          <p:nvPr>
-            <p:ph type="title"/>
-          </p:nvPr>
-        </p:nvSpPr>
-        <p:spPr/>
-        <p:txBody>
-          <a:bodyPr/>
-          <a:lstStyle/>
-          <a:p>
-            <a:pPr eaLnBrk="1" hangingPunct="1"/>
-            <a:r>
-              <a:rPr lang="en-US" sz="3600" dirty="0" err="1" smtClean="0"/>
-              <a:t>Xác</a:t>
-            </a:r>
-            <a:r>
-              <a:rPr lang="en-US" sz="3600" dirty="0" smtClean="0"/>
-              <a:t> </a:t>
-            </a:r>
-            <a:r>
-              <a:rPr lang="en-US" sz="3600" dirty="0" err="1" smtClean="0"/>
-              <a:t>định</a:t>
-            </a:r>
-            <a:r>
-              <a:rPr lang="en-US" sz="3600" dirty="0" smtClean="0"/>
-              <a:t> </a:t>
-            </a:r>
-            <a:r>
-              <a:rPr lang="en-US" sz="3600" i="1" dirty="0" smtClean="0"/>
-              <a:t>p</a:t>
-            </a:r>
-            <a:r>
-              <a:rPr lang="en-US" sz="3600" i="1" baseline="-25000" dirty="0" smtClean="0"/>
-              <a:t>i</a:t>
-            </a:r>
-            <a:r>
-              <a:rPr lang="en-US" sz="3600" i="1" dirty="0" smtClean="0"/>
-              <a:t> </a:t>
-            </a:r>
-            <a:r>
-              <a:rPr lang="en-US" sz="3600" i="1" dirty="0" err="1" smtClean="0"/>
-              <a:t>và</a:t>
-            </a:r>
-            <a:r>
-              <a:rPr lang="en-US" sz="3600" i="1" dirty="0" smtClean="0"/>
-              <a:t> </a:t>
-            </a:r>
-            <a:r>
-              <a:rPr lang="en-US" sz="3600" i="1" dirty="0" err="1" smtClean="0"/>
-              <a:t>r</a:t>
-            </a:r>
-            <a:r>
-              <a:rPr lang="en-US" sz="3600" i="1" baseline="-25000" dirty="0" err="1" smtClean="0"/>
-              <a:t>i</a:t>
-            </a:r>
-            <a:r>
-              <a:rPr lang="en-US" sz="3600" i="1" baseline="-25000" dirty="0" smtClean="0"/>
-              <a:t> </a:t>
-            </a:r>
-            <a:r>
-              <a:rPr lang="en-US" sz="3600" dirty="0" err="1" smtClean="0"/>
-              <a:t>nhờ</a:t>
-            </a:r>
-            <a:r>
-              <a:rPr lang="en-US" sz="3600" dirty="0" smtClean="0"/>
-              <a:t> </a:t>
-            </a:r>
-            <a:r>
-              <a:rPr lang="en-US" sz="3600" dirty="0" err="1" smtClean="0"/>
-              <a:t>vòng</a:t>
-            </a:r>
-            <a:r>
-              <a:rPr lang="en-US" sz="3600" dirty="0" smtClean="0"/>
-              <a:t> </a:t>
-            </a:r>
-            <a:r>
-              <a:rPr lang="en-US" sz="3600" dirty="0" err="1" smtClean="0"/>
-              <a:t>lặp</a:t>
-            </a:r>
-            <a:r>
-              <a:rPr lang="en-US" sz="3600" dirty="0" smtClean="0"/>
-              <a:t> </a:t>
-            </a:r>
-            <a:endParaRPr lang="en-US" sz="3600" baseline="-25000" dirty="0" smtClean="0"/>
-          </a:p>
-        </p:txBody>
-      </p:sp>
-      <p:sp>
-        <p:nvSpPr>
-          <p:cNvPr id="30724" name="Rectangle 5"/>
-          <p:cNvSpPr>
-            <a:spLocks noGrp="1" noChangeArrowheads="1"/>
-          </p:cNvSpPr>
-          <p:nvPr>
-            <p:ph type="body" idx="1"/>
-          </p:nvPr>
-        </p:nvSpPr>
-        <p:spPr>
-          <a:xfrm>
-            <a:off x="250825" y="2017712"/>
-            <a:ext cx="8704263" cy="4459287"/>
-          </a:xfrm>
-        </p:spPr>
-        <p:txBody>
-          <a:bodyPr/>
-          <a:lstStyle/>
-          <a:p>
-            <a:pPr marL="0" indent="0" eaLnBrk="1" hangingPunct="1">
-              <a:buNone/>
-            </a:pPr>
-            <a:r>
-              <a:rPr lang="en-US" sz="2800" dirty="0" err="1" smtClean="0"/>
-              <a:t>Phù</a:t>
-            </a:r>
-            <a:r>
-              <a:rPr lang="en-US" sz="2800" dirty="0" smtClean="0"/>
-              <a:t> </a:t>
-            </a:r>
-            <a:r>
-              <a:rPr lang="en-US" sz="2800" dirty="0" err="1"/>
-              <a:t>hợp</a:t>
-            </a:r>
-            <a:r>
-              <a:rPr lang="en-US" sz="2800" dirty="0"/>
-              <a:t> </a:t>
-            </a:r>
-            <a:r>
-              <a:rPr lang="en-US" sz="2800" dirty="0" err="1"/>
-              <a:t>phản</a:t>
-            </a:r>
-            <a:r>
-              <a:rPr lang="en-US" sz="2800" dirty="0"/>
-              <a:t> </a:t>
-            </a:r>
-            <a:r>
-              <a:rPr lang="en-US" sz="2800" dirty="0" err="1"/>
-              <a:t>hồi</a:t>
-            </a:r>
-            <a:r>
-              <a:rPr lang="en-US" sz="2800" dirty="0"/>
-              <a:t> </a:t>
-            </a:r>
-            <a:r>
-              <a:rPr lang="en-US" sz="2800" dirty="0" err="1"/>
-              <a:t>giả</a:t>
-            </a:r>
-            <a:r>
-              <a:rPr lang="en-US" sz="2800" dirty="0"/>
-              <a:t> </a:t>
-            </a:r>
-            <a:r>
-              <a:rPr lang="en-US" sz="2800" dirty="0" err="1"/>
-              <a:t>lập</a:t>
-            </a:r>
-            <a:endParaRPr lang="en-US" sz="2800" dirty="0"/>
-          </a:p>
-          <a:p>
-            <a:pPr eaLnBrk="1" hangingPunct="1"/>
-            <a:r>
-              <a:rPr lang="en-US" sz="2400" dirty="0" smtClean="0"/>
-              <a:t>1. </a:t>
-            </a:r>
-            <a:r>
-              <a:rPr lang="en-US" sz="2400" dirty="0" err="1" smtClean="0"/>
-              <a:t>Giả</a:t>
-            </a:r>
-            <a:r>
-              <a:rPr lang="en-US" sz="2400" dirty="0" smtClean="0"/>
-              <a:t> </a:t>
-            </a:r>
-            <a:r>
-              <a:rPr lang="en-US" sz="2400" dirty="0" err="1" smtClean="0"/>
-              <a:t>sử</a:t>
-            </a:r>
-            <a:r>
-              <a:rPr lang="en-US" sz="2400" dirty="0" smtClean="0"/>
-              <a:t> p</a:t>
-            </a:r>
-            <a:r>
-              <a:rPr lang="en-US" sz="2400" baseline="-25000" dirty="0" smtClean="0"/>
-              <a:t>i</a:t>
-            </a:r>
-            <a:r>
-              <a:rPr lang="en-US" sz="2400" dirty="0" smtClean="0"/>
-              <a:t> </a:t>
-            </a:r>
-            <a:r>
-              <a:rPr lang="en-US" sz="2400" dirty="0" err="1" smtClean="0"/>
-              <a:t>là</a:t>
-            </a:r>
-            <a:r>
-              <a:rPr lang="en-US" sz="2400" dirty="0" smtClean="0"/>
-              <a:t> hằng </a:t>
-            </a:r>
-            <a:r>
-              <a:rPr lang="en-US" sz="2400" dirty="0" err="1" smtClean="0"/>
-              <a:t>số</a:t>
-            </a:r>
-            <a:r>
-              <a:rPr lang="en-US" sz="2400" dirty="0" smtClean="0"/>
-              <a:t> </a:t>
-            </a:r>
-            <a:r>
-              <a:rPr lang="en-US" sz="2400" dirty="0" err="1" smtClean="0"/>
-              <a:t>với</a:t>
-            </a:r>
-            <a:r>
-              <a:rPr lang="en-US" sz="2400" dirty="0" smtClean="0"/>
-              <a:t> </a:t>
-            </a:r>
-            <a:r>
-              <a:rPr lang="en-US" sz="2400" dirty="0" err="1" smtClean="0"/>
-              <a:t>mọi</a:t>
-            </a:r>
-            <a:r>
-              <a:rPr lang="en-US" sz="2400" dirty="0" smtClean="0"/>
-              <a:t> x</a:t>
-            </a:r>
-            <a:r>
-              <a:rPr lang="en-US" sz="2400" baseline="-25000" dirty="0" smtClean="0"/>
-              <a:t>i</a:t>
-            </a:r>
-            <a:r>
-              <a:rPr lang="en-US" sz="2400" dirty="0" smtClean="0"/>
-              <a:t> </a:t>
-            </a:r>
-            <a:r>
-              <a:rPr lang="en-US" sz="2400" dirty="0" err="1" smtClean="0"/>
-              <a:t>trong</a:t>
-            </a:r>
-            <a:r>
-              <a:rPr lang="en-US" sz="2400" dirty="0" smtClean="0"/>
-              <a:t> </a:t>
-            </a:r>
-            <a:r>
-              <a:rPr lang="en-US" sz="2400" dirty="0" err="1" smtClean="0"/>
-              <a:t>truy</a:t>
-            </a:r>
-            <a:r>
-              <a:rPr lang="en-US" sz="2400" dirty="0" smtClean="0"/>
-              <a:t> </a:t>
-            </a:r>
-            <a:r>
-              <a:rPr lang="en-US" sz="2400" dirty="0" err="1" smtClean="0"/>
-              <a:t>vấn</a:t>
-            </a:r>
-            <a:r>
-              <a:rPr lang="en-US" sz="2400" dirty="0" smtClean="0"/>
-              <a:t>. </a:t>
-            </a:r>
-            <a:r>
-              <a:rPr lang="en-US" sz="2400" i="1" dirty="0" err="1" smtClean="0"/>
-              <a:t>Ví</a:t>
-            </a:r>
-            <a:r>
-              <a:rPr lang="en-US" sz="2400" i="1" dirty="0" smtClean="0"/>
-              <a:t> </a:t>
-            </a:r>
-            <a:r>
-              <a:rPr lang="en-US" sz="2400" i="1" dirty="0" err="1" smtClean="0"/>
-              <a:t>dụ</a:t>
-            </a:r>
-            <a:r>
-              <a:rPr lang="en-US" sz="2400" i="1" dirty="0" smtClean="0"/>
-              <a:t>, p</a:t>
-            </a:r>
-            <a:r>
-              <a:rPr lang="en-US" sz="2400" i="1" baseline="-25000" dirty="0" smtClean="0"/>
-              <a:t>i</a:t>
-            </a:r>
-            <a:r>
-              <a:rPr lang="en-US" sz="2400" dirty="0" smtClean="0"/>
-              <a:t> = 0.5 </a:t>
-            </a:r>
-            <a:r>
-              <a:rPr lang="en-US" sz="2400" dirty="0" err="1" smtClean="0"/>
-              <a:t>với</a:t>
-            </a:r>
-            <a:r>
-              <a:rPr lang="en-US" sz="2400" dirty="0" smtClean="0"/>
-              <a:t> </a:t>
-            </a:r>
-            <a:r>
-              <a:rPr lang="en-US" sz="2400" dirty="0" err="1" smtClean="0"/>
-              <a:t>văn</a:t>
-            </a:r>
-            <a:r>
-              <a:rPr lang="en-US" sz="2400" dirty="0" smtClean="0"/>
-              <a:t> </a:t>
-            </a:r>
-            <a:r>
-              <a:rPr lang="en-US" sz="2400" dirty="0" err="1" smtClean="0"/>
-              <a:t>bản</a:t>
-            </a:r>
-            <a:r>
-              <a:rPr lang="en-US" sz="2400" dirty="0" smtClean="0"/>
-              <a:t> </a:t>
-            </a:r>
-            <a:r>
-              <a:rPr lang="en-US" sz="2400" dirty="0" err="1" smtClean="0"/>
-              <a:t>bất</a:t>
-            </a:r>
-            <a:r>
-              <a:rPr lang="en-US" sz="2400" dirty="0" smtClean="0"/>
-              <a:t> </a:t>
-            </a:r>
-            <a:r>
-              <a:rPr lang="en-US" sz="2400" dirty="0" err="1" smtClean="0"/>
-              <a:t>kỳ</a:t>
-            </a:r>
-            <a:endParaRPr lang="en-US" sz="2400" dirty="0" smtClean="0"/>
-          </a:p>
-          <a:p>
-            <a:pPr algn="just" eaLnBrk="1" hangingPunct="1"/>
-            <a:r>
-              <a:rPr lang="en-US" sz="2400" dirty="0" smtClean="0"/>
-              <a:t>2. </a:t>
-            </a:r>
-            <a:r>
-              <a:rPr lang="en-US" sz="2400" dirty="0" err="1" smtClean="0"/>
-              <a:t>Giả</a:t>
-            </a:r>
-            <a:r>
-              <a:rPr lang="en-US" sz="2400" dirty="0" smtClean="0"/>
-              <a:t> </a:t>
-            </a:r>
-            <a:r>
-              <a:rPr lang="en-US" sz="2400" dirty="0" err="1" smtClean="0"/>
-              <a:t>sử</a:t>
-            </a:r>
-            <a:r>
-              <a:rPr lang="en-US" sz="2400" dirty="0" smtClean="0"/>
-              <a:t> </a:t>
-            </a:r>
-            <a:r>
-              <a:rPr lang="en-US" sz="2400" dirty="0" err="1" smtClean="0"/>
-              <a:t>tập</a:t>
-            </a:r>
-            <a:r>
-              <a:rPr lang="en-US" sz="2400" dirty="0" smtClean="0"/>
-              <a:t> V</a:t>
-            </a:r>
-            <a:r>
-              <a:rPr lang="en-US" sz="2000" dirty="0" smtClean="0"/>
-              <a:t> </a:t>
-            </a:r>
-            <a:r>
-              <a:rPr lang="en-US" sz="2400" dirty="0" err="1" smtClean="0"/>
-              <a:t>với</a:t>
-            </a:r>
-            <a:r>
-              <a:rPr lang="en-US" sz="2400" dirty="0" smtClean="0"/>
-              <a:t> </a:t>
-            </a:r>
-            <a:r>
-              <a:rPr lang="en-US" sz="2400" dirty="0" err="1" smtClean="0"/>
-              <a:t>những</a:t>
-            </a:r>
-            <a:r>
-              <a:rPr lang="en-US" sz="2400" dirty="0" smtClean="0"/>
-              <a:t> </a:t>
-            </a:r>
-            <a:r>
-              <a:rPr lang="en-US" sz="2400" dirty="0" err="1" smtClean="0"/>
-              <a:t>văn</a:t>
-            </a:r>
-            <a:r>
-              <a:rPr lang="en-US" sz="2400" dirty="0" smtClean="0"/>
-              <a:t> </a:t>
-            </a:r>
-            <a:r>
-              <a:rPr lang="en-US" sz="2400" dirty="0" err="1" smtClean="0"/>
-              <a:t>bản</a:t>
-            </a:r>
-            <a:r>
-              <a:rPr lang="en-US" sz="2400" dirty="0" smtClean="0"/>
-              <a:t> </a:t>
-            </a:r>
-            <a:r>
-              <a:rPr lang="en-US" sz="2400" dirty="0" err="1" smtClean="0"/>
-              <a:t>được</a:t>
-            </a:r>
-            <a:r>
-              <a:rPr lang="en-US" sz="2400" dirty="0" smtClean="0"/>
-              <a:t> </a:t>
-            </a:r>
-            <a:r>
-              <a:rPr lang="en-US" sz="2400" dirty="0" err="1" smtClean="0"/>
-              <a:t>xếp</a:t>
-            </a:r>
-            <a:r>
-              <a:rPr lang="en-US" sz="2400" dirty="0" smtClean="0"/>
-              <a:t> </a:t>
-            </a:r>
-            <a:r>
-              <a:rPr lang="en-US" sz="2400" dirty="0" err="1" smtClean="0"/>
-              <a:t>hạng</a:t>
-            </a:r>
-            <a:r>
-              <a:rPr lang="en-US" sz="2400" dirty="0" smtClean="0"/>
-              <a:t> </a:t>
-            </a:r>
-            <a:r>
-              <a:rPr lang="en-US" sz="2400" dirty="0" err="1" smtClean="0"/>
-              <a:t>cao</a:t>
-            </a:r>
-            <a:r>
-              <a:rPr lang="en-US" sz="2400" dirty="0" smtClean="0"/>
-              <a:t> </a:t>
-            </a:r>
-            <a:r>
-              <a:rPr lang="en-US" sz="2400" dirty="0" err="1" smtClean="0"/>
-              <a:t>nhất</a:t>
-            </a:r>
-            <a:r>
-              <a:rPr lang="en-US" sz="2400" dirty="0" smtClean="0"/>
-              <a:t> </a:t>
-            </a:r>
-            <a:r>
-              <a:rPr lang="en-US" sz="2400" dirty="0" err="1" smtClean="0"/>
-              <a:t>theo</a:t>
-            </a:r>
-            <a:r>
-              <a:rPr lang="en-US" sz="2400" dirty="0" smtClean="0"/>
-              <a:t> </a:t>
-            </a:r>
-            <a:r>
-              <a:rPr lang="en-US" sz="2400" dirty="0" err="1" smtClean="0"/>
-              <a:t>mô</a:t>
-            </a:r>
-            <a:r>
-              <a:rPr lang="en-US" sz="2400" dirty="0" smtClean="0"/>
-              <a:t> </a:t>
-            </a:r>
-            <a:r>
-              <a:rPr lang="en-US" sz="2400" dirty="0" err="1" smtClean="0"/>
-              <a:t>hình</a:t>
-            </a:r>
-            <a:r>
-              <a:rPr lang="en-US" sz="2400" dirty="0" smtClean="0"/>
-              <a:t> </a:t>
-            </a:r>
-            <a:r>
-              <a:rPr lang="en-US" sz="2400" dirty="0" err="1" smtClean="0"/>
-              <a:t>này</a:t>
-            </a:r>
-            <a:r>
-              <a:rPr lang="en-US" sz="2400" dirty="0" smtClean="0"/>
-              <a:t> </a:t>
-            </a:r>
-            <a:r>
-              <a:rPr lang="en-US" sz="2400" dirty="0" err="1" smtClean="0"/>
-              <a:t>là</a:t>
-            </a:r>
-            <a:r>
-              <a:rPr lang="en-US" sz="2400" dirty="0" smtClean="0"/>
-              <a:t> </a:t>
-            </a:r>
-            <a:r>
-              <a:rPr lang="en-US" sz="2400" dirty="0" err="1" smtClean="0"/>
-              <a:t>những</a:t>
-            </a:r>
-            <a:r>
-              <a:rPr lang="en-US" sz="2400" dirty="0" smtClean="0"/>
-              <a:t> </a:t>
-            </a:r>
-            <a:r>
-              <a:rPr lang="en-US" sz="2400" dirty="0" err="1" smtClean="0"/>
-              <a:t>văn</a:t>
-            </a:r>
-            <a:r>
-              <a:rPr lang="en-US" sz="2400" dirty="0" smtClean="0"/>
-              <a:t> </a:t>
-            </a:r>
-            <a:r>
-              <a:rPr lang="en-US" sz="2400" dirty="0" err="1" smtClean="0"/>
-              <a:t>bản</a:t>
-            </a:r>
-            <a:r>
-              <a:rPr lang="en-US" sz="2400" dirty="0" smtClean="0"/>
-              <a:t> </a:t>
-            </a:r>
-            <a:r>
-              <a:rPr lang="en-US" sz="2400" dirty="0" err="1" smtClean="0"/>
-              <a:t>phù</a:t>
-            </a:r>
-            <a:r>
-              <a:rPr lang="en-US" sz="2400" dirty="0" smtClean="0"/>
-              <a:t> </a:t>
-            </a:r>
-            <a:r>
-              <a:rPr lang="en-US" sz="2400" dirty="0" err="1" smtClean="0"/>
-              <a:t>hợp</a:t>
-            </a:r>
-            <a:r>
-              <a:rPr lang="en-US" sz="2400" dirty="0" smtClean="0"/>
-              <a:t>.</a:t>
-            </a:r>
-          </a:p>
-          <a:p>
-            <a:pPr algn="just" eaLnBrk="1" hangingPunct="1"/>
-            <a:r>
-              <a:rPr lang="en-US" sz="2400" dirty="0" smtClean="0"/>
-              <a:t>3.</a:t>
-            </a:r>
-            <a:r>
-              <a:rPr lang="en-US" sz="2800" dirty="0" smtClean="0"/>
-              <a:t> </a:t>
-            </a:r>
-            <a:r>
-              <a:rPr lang="en-US" sz="2400" dirty="0" err="1" smtClean="0"/>
-              <a:t>Cần</a:t>
-            </a:r>
-            <a:r>
-              <a:rPr lang="en-US" sz="2400" dirty="0" smtClean="0"/>
-              <a:t> </a:t>
-            </a:r>
-            <a:r>
-              <a:rPr lang="en-US" sz="2400" dirty="0" err="1" smtClean="0"/>
-              <a:t>xác</a:t>
-            </a:r>
-            <a:r>
-              <a:rPr lang="en-US" sz="2400" dirty="0" smtClean="0"/>
-              <a:t> </a:t>
-            </a:r>
-            <a:r>
-              <a:rPr lang="en-US" sz="2400" dirty="0" err="1" smtClean="0"/>
-              <a:t>định</a:t>
-            </a:r>
-            <a:r>
-              <a:rPr lang="en-US" sz="2400" dirty="0" smtClean="0"/>
-              <a:t> </a:t>
-            </a:r>
-            <a:r>
-              <a:rPr lang="en-US" sz="2400" dirty="0" err="1" smtClean="0"/>
-              <a:t>lại</a:t>
-            </a:r>
-            <a:r>
-              <a:rPr lang="en-US" sz="2400" dirty="0" smtClean="0"/>
-              <a:t> </a:t>
-            </a:r>
-            <a:r>
-              <a:rPr lang="en-US" sz="2400" i="1" dirty="0" smtClean="0"/>
-              <a:t>p</a:t>
-            </a:r>
-            <a:r>
-              <a:rPr lang="en-US" sz="2400" i="1" baseline="-25000" dirty="0" smtClean="0"/>
-              <a:t>i</a:t>
-            </a:r>
-            <a:r>
-              <a:rPr lang="en-US" sz="2400" dirty="0" smtClean="0"/>
-              <a:t> </a:t>
-            </a:r>
-            <a:r>
-              <a:rPr lang="en-US" sz="2400" dirty="0" err="1" smtClean="0"/>
-              <a:t>và</a:t>
-            </a:r>
-            <a:r>
-              <a:rPr lang="en-US" sz="2400" dirty="0" smtClean="0"/>
-              <a:t> </a:t>
-            </a:r>
-            <a:r>
-              <a:rPr lang="en-US" sz="2400" i="1" dirty="0" err="1" smtClean="0"/>
-              <a:t>r</a:t>
-            </a:r>
-            <a:r>
-              <a:rPr lang="en-US" sz="2400" i="1" baseline="-25000" dirty="0" err="1" smtClean="0"/>
-              <a:t>i</a:t>
-            </a:r>
-            <a:r>
-              <a:rPr lang="en-US" sz="2400" dirty="0" smtClean="0"/>
-              <a:t>, </a:t>
-            </a:r>
-            <a:r>
-              <a:rPr lang="en-US" sz="2400" dirty="0" err="1" smtClean="0"/>
-              <a:t>sử</a:t>
-            </a:r>
-            <a:r>
-              <a:rPr lang="en-US" sz="2400" dirty="0" smtClean="0"/>
-              <a:t> </a:t>
-            </a:r>
-            <a:r>
-              <a:rPr lang="en-US" sz="2400" dirty="0" err="1" smtClean="0"/>
-              <a:t>dụng</a:t>
-            </a:r>
-            <a:r>
-              <a:rPr lang="en-US" sz="2400" dirty="0" smtClean="0"/>
-              <a:t> </a:t>
-            </a:r>
-            <a:r>
-              <a:rPr lang="en-US" sz="2400" dirty="0" err="1" smtClean="0"/>
-              <a:t>phân</a:t>
-            </a:r>
-            <a:r>
-              <a:rPr lang="en-US" sz="2400" dirty="0" smtClean="0"/>
-              <a:t> </a:t>
-            </a:r>
-            <a:r>
-              <a:rPr lang="en-US" sz="2400" dirty="0" err="1" smtClean="0"/>
-              <a:t>bố</a:t>
-            </a:r>
-            <a:r>
-              <a:rPr lang="en-US" sz="2400" dirty="0" smtClean="0"/>
-              <a:t> </a:t>
-            </a:r>
-            <a:r>
-              <a:rPr lang="en-US" sz="2400" dirty="0" err="1" smtClean="0"/>
-              <a:t>từ</a:t>
-            </a:r>
-            <a:r>
-              <a:rPr lang="en-US" sz="2400" dirty="0" smtClean="0"/>
-              <a:t> </a:t>
-            </a:r>
-            <a:r>
-              <a:rPr lang="en-US" sz="2400" dirty="0" err="1" smtClean="0"/>
-              <a:t>trong</a:t>
-            </a:r>
-            <a:r>
-              <a:rPr lang="en-US" sz="2400" dirty="0" smtClean="0"/>
-              <a:t> V. </a:t>
-            </a:r>
-            <a:r>
-              <a:rPr lang="en-US" sz="2400" dirty="0" err="1" smtClean="0"/>
-              <a:t>Đặt</a:t>
-            </a:r>
-            <a:r>
-              <a:rPr lang="en-US" sz="2400" dirty="0" smtClean="0"/>
-              <a:t> V</a:t>
-            </a:r>
-            <a:r>
-              <a:rPr lang="en-US" sz="2400" baseline="-25000" dirty="0" smtClean="0"/>
-              <a:t>i</a:t>
-            </a:r>
-            <a:r>
-              <a:rPr lang="en-US" sz="2400" dirty="0" smtClean="0"/>
-              <a:t> </a:t>
-            </a:r>
-            <a:r>
-              <a:rPr lang="en-US" sz="2400" dirty="0" err="1" smtClean="0"/>
-              <a:t>là</a:t>
-            </a:r>
-            <a:r>
-              <a:rPr lang="en-US" sz="2400" dirty="0" smtClean="0"/>
-              <a:t> </a:t>
-            </a:r>
-            <a:r>
-              <a:rPr lang="en-US" sz="2400" dirty="0" err="1" smtClean="0"/>
-              <a:t>tập</a:t>
-            </a:r>
-            <a:r>
-              <a:rPr lang="en-US" sz="2400" dirty="0" smtClean="0"/>
-              <a:t> 	</a:t>
-            </a:r>
-            <a:r>
-              <a:rPr lang="en-US" sz="2400" dirty="0" err="1" smtClean="0"/>
-              <a:t>văn</a:t>
-            </a:r>
-            <a:r>
-              <a:rPr lang="en-US" sz="2400" dirty="0" smtClean="0"/>
-              <a:t> </a:t>
-            </a:r>
-            <a:r>
-              <a:rPr lang="en-US" sz="2400" dirty="0" err="1" smtClean="0"/>
-              <a:t>bản</a:t>
-            </a:r>
-            <a:r>
-              <a:rPr lang="en-US" sz="2400" dirty="0" smtClean="0"/>
-              <a:t> </a:t>
-            </a:r>
-            <a:r>
-              <a:rPr lang="en-US" sz="2400" dirty="0" err="1" smtClean="0"/>
-              <a:t>có</a:t>
-            </a:r>
-            <a:r>
-              <a:rPr lang="en-US" sz="2400" dirty="0" smtClean="0"/>
-              <a:t> 	</a:t>
-            </a:r>
-            <a:r>
-              <a:rPr lang="en-US" sz="2400" dirty="0" err="1" smtClean="0"/>
-              <a:t>chứa</a:t>
-            </a:r>
-            <a:r>
-              <a:rPr lang="en-US" sz="2400" dirty="0" smtClean="0"/>
-              <a:t> </a:t>
-            </a:r>
-            <a:r>
-              <a:rPr lang="en-US" sz="2400" i="1" dirty="0" smtClean="0"/>
-              <a:t>x</a:t>
-            </a:r>
-            <a:r>
-              <a:rPr lang="en-US" sz="2400" i="1" baseline="-25000" dirty="0" smtClean="0"/>
-              <a:t>i</a:t>
-            </a:r>
-            <a:r>
-              <a:rPr lang="en-US" sz="2400" dirty="0" smtClean="0"/>
-              <a:t> , </a:t>
-            </a:r>
-            <a:r>
-              <a:rPr lang="en-US" sz="2400" dirty="0" err="1" smtClean="0"/>
-              <a:t>chúng</a:t>
-            </a:r>
-            <a:r>
-              <a:rPr lang="en-US" sz="2400" dirty="0" smtClean="0"/>
-              <a:t> ta </a:t>
-            </a:r>
-            <a:r>
-              <a:rPr lang="en-US" sz="2400" dirty="0" err="1" smtClean="0"/>
-              <a:t>có</a:t>
-            </a:r>
-            <a:r>
-              <a:rPr lang="en-US" sz="2400" dirty="0" smtClean="0"/>
-              <a:t>  </a:t>
-            </a:r>
-            <a:r>
-              <a:rPr lang="en-US" sz="2400" i="1" dirty="0" smtClean="0"/>
-              <a:t>p</a:t>
-            </a:r>
-            <a:r>
-              <a:rPr lang="en-US" sz="2400" i="1" baseline="-25000" dirty="0" smtClean="0"/>
-              <a:t>i</a:t>
-            </a:r>
-            <a:r>
-              <a:rPr lang="en-US" sz="2400" dirty="0" smtClean="0"/>
-              <a:t> = |V</a:t>
-            </a:r>
-            <a:r>
-              <a:rPr lang="en-US" sz="2400" baseline="-25000" dirty="0" smtClean="0"/>
-              <a:t>i</a:t>
-            </a:r>
-            <a:r>
-              <a:rPr lang="en-US" sz="2400" dirty="0" smtClean="0"/>
-              <a:t>| / |V|</a:t>
-            </a:r>
-          </a:p>
-          <a:p>
-            <a:pPr algn="just" eaLnBrk="1" hangingPunct="1"/>
-            <a:r>
-              <a:rPr lang="en-US" sz="2400" dirty="0" smtClean="0"/>
-              <a:t>4. </a:t>
-            </a:r>
-            <a:r>
-              <a:rPr lang="en-US" sz="2400" dirty="0" err="1" smtClean="0"/>
-              <a:t>Giả</a:t>
-            </a:r>
-            <a:r>
-              <a:rPr lang="en-US" sz="2400" dirty="0" smtClean="0"/>
-              <a:t> </a:t>
-            </a:r>
-            <a:r>
-              <a:rPr lang="en-US" sz="2400" dirty="0" err="1" smtClean="0"/>
-              <a:t>sử</a:t>
-            </a:r>
-            <a:r>
-              <a:rPr lang="en-US" sz="2400" dirty="0" smtClean="0"/>
-              <a:t> </a:t>
-            </a:r>
-            <a:r>
-              <a:rPr lang="en-US" sz="2400" dirty="0" err="1" smtClean="0"/>
-              <a:t>không</a:t>
-            </a:r>
-            <a:r>
-              <a:rPr lang="en-US" sz="2400" dirty="0" smtClean="0"/>
-              <a:t> </a:t>
-            </a:r>
-            <a:r>
-              <a:rPr lang="en-US" sz="2400" dirty="0" err="1" smtClean="0"/>
-              <a:t>được</a:t>
-            </a:r>
-            <a:r>
-              <a:rPr lang="en-US" sz="2400" dirty="0" smtClean="0"/>
-              <a:t> </a:t>
-            </a:r>
-            <a:r>
-              <a:rPr lang="en-US" sz="2400" dirty="0" err="1" smtClean="0"/>
-              <a:t>trả</a:t>
-            </a:r>
-            <a:r>
-              <a:rPr lang="en-US" sz="2400" dirty="0" smtClean="0"/>
-              <a:t> </a:t>
-            </a:r>
-            <a:r>
-              <a:rPr lang="en-US" sz="2400" dirty="0" err="1" smtClean="0"/>
-              <a:t>về</a:t>
-            </a:r>
-            <a:r>
-              <a:rPr lang="en-US" sz="2400" dirty="0" smtClean="0"/>
-              <a:t> </a:t>
-            </a:r>
-            <a:r>
-              <a:rPr lang="en-US" sz="2400" dirty="0" err="1" smtClean="0"/>
-              <a:t>đồng</a:t>
-            </a:r>
-            <a:r>
-              <a:rPr lang="en-US" sz="2400" dirty="0" smtClean="0"/>
-              <a:t> </a:t>
-            </a:r>
-            <a:r>
-              <a:rPr lang="en-US" sz="2400" dirty="0" err="1" smtClean="0"/>
-              <a:t>nghĩa</a:t>
-            </a:r>
-            <a:r>
-              <a:rPr lang="en-US" sz="2400" dirty="0" smtClean="0"/>
-              <a:t> </a:t>
-            </a:r>
-            <a:r>
-              <a:rPr lang="en-US" sz="2400" dirty="0" err="1" smtClean="0"/>
-              <a:t>với</a:t>
-            </a:r>
-            <a:r>
-              <a:rPr lang="en-US" sz="2400" dirty="0" smtClean="0"/>
-              <a:t> </a:t>
-            </a:r>
-            <a:r>
-              <a:rPr lang="en-US" sz="2400" dirty="0" err="1" smtClean="0"/>
-              <a:t>không</a:t>
-            </a:r>
-            <a:r>
-              <a:rPr lang="en-US" sz="2400" dirty="0" smtClean="0"/>
-              <a:t> </a:t>
-            </a:r>
-            <a:r>
-              <a:rPr lang="en-US" sz="2400" dirty="0" err="1" smtClean="0"/>
-              <a:t>phù</a:t>
-            </a:r>
-            <a:r>
-              <a:rPr lang="en-US" sz="2400" dirty="0" smtClean="0"/>
-              <a:t> </a:t>
-            </a:r>
-            <a:r>
-              <a:rPr lang="en-US" sz="2400" dirty="0" err="1" smtClean="0"/>
-              <a:t>hợp</a:t>
-            </a:r>
-            <a:r>
-              <a:rPr lang="en-US" sz="2400" dirty="0" smtClean="0"/>
-              <a:t>, </a:t>
-            </a:r>
-            <a:r>
-              <a:rPr lang="en-US" sz="2800" i="1" dirty="0" err="1" smtClean="0"/>
-              <a:t>r</a:t>
-            </a:r>
-            <a:r>
-              <a:rPr lang="en-US" sz="2800" i="1" baseline="-25000" dirty="0" err="1" smtClean="0"/>
-              <a:t>i</a:t>
-            </a:r>
-            <a:r>
-              <a:rPr lang="en-US" sz="2800" dirty="0" smtClean="0"/>
-              <a:t>  = (</a:t>
-            </a:r>
-            <a:r>
-              <a:rPr lang="en-US" sz="2800" dirty="0" err="1" smtClean="0"/>
-              <a:t>n</a:t>
-            </a:r>
-            <a:r>
-              <a:rPr lang="en-US" sz="2800" baseline="-25000" dirty="0" err="1" smtClean="0"/>
-              <a:t>i</a:t>
-            </a:r>
-            <a:r>
-              <a:rPr lang="en-US" sz="2800" dirty="0" smtClean="0"/>
-              <a:t> – |V</a:t>
-            </a:r>
-            <a:r>
-              <a:rPr lang="en-US" sz="2800" baseline="-25000" dirty="0" smtClean="0"/>
-              <a:t>i</a:t>
-            </a:r>
-            <a:r>
-              <a:rPr lang="en-US" sz="2800" dirty="0" smtClean="0"/>
-              <a:t>|) / (N – |V|)</a:t>
-            </a:r>
-            <a:endParaRPr lang="en-US" sz="3600" dirty="0" smtClean="0"/>
-          </a:p>
-          <a:p>
-            <a:pPr algn="just" eaLnBrk="1" hangingPunct="1"/>
-            <a:r>
-              <a:rPr lang="en-US" sz="2400" dirty="0" smtClean="0"/>
-              <a:t>5. </a:t>
-            </a:r>
-            <a:r>
-              <a:rPr lang="en-US" sz="2400" dirty="0" err="1" smtClean="0"/>
-              <a:t>Lặp</a:t>
-            </a:r>
-            <a:r>
-              <a:rPr lang="en-US" sz="2400" dirty="0" smtClean="0"/>
-              <a:t> </a:t>
-            </a:r>
-            <a:r>
-              <a:rPr lang="en-US" sz="2400" dirty="0" err="1" smtClean="0"/>
-              <a:t>các</a:t>
-            </a:r>
-            <a:r>
-              <a:rPr lang="en-US" sz="2400" dirty="0" smtClean="0"/>
-              <a:t> </a:t>
-            </a:r>
-            <a:r>
-              <a:rPr lang="en-US" sz="2400" dirty="0" err="1" smtClean="0"/>
-              <a:t>bước</a:t>
-            </a:r>
-            <a:r>
-              <a:rPr lang="en-US" sz="2400" dirty="0" smtClean="0"/>
-              <a:t> 2-4 </a:t>
-            </a:r>
-            <a:r>
-              <a:rPr lang="en-US" sz="2400" dirty="0" err="1" smtClean="0"/>
-              <a:t>cho</a:t>
-            </a:r>
-            <a:r>
-              <a:rPr lang="en-US" sz="2400" dirty="0" smtClean="0"/>
-              <a:t> </a:t>
-            </a:r>
-            <a:r>
-              <a:rPr lang="en-US" sz="2400" dirty="0" err="1" smtClean="0"/>
-              <a:t>tới</a:t>
-            </a:r>
-            <a:r>
-              <a:rPr lang="en-US" sz="2400" dirty="0" smtClean="0"/>
-              <a:t> </a:t>
-            </a:r>
-            <a:r>
-              <a:rPr lang="en-US" sz="2400" dirty="0" err="1" smtClean="0"/>
-              <a:t>khi</a:t>
-            </a:r>
-            <a:r>
-              <a:rPr lang="en-US" sz="2400" dirty="0" smtClean="0"/>
-              <a:t> </a:t>
-            </a:r>
-            <a:r>
-              <a:rPr lang="en-US" sz="2400" dirty="0" err="1" smtClean="0"/>
-              <a:t>hội</a:t>
-            </a:r>
-            <a:r>
-              <a:rPr lang="en-US" sz="2400" dirty="0" smtClean="0"/>
-              <a:t> </a:t>
-            </a:r>
-            <a:r>
-              <a:rPr lang="en-US" sz="2400" dirty="0" err="1" smtClean="0"/>
-              <a:t>tụ</a:t>
-            </a:r>
-            <a:r>
-              <a:rPr lang="en-US" sz="2400" dirty="0" smtClean="0"/>
-              <a:t> </a:t>
-            </a:r>
-            <a:r>
-              <a:rPr lang="en-US" sz="2400" dirty="0" err="1" smtClean="0"/>
-              <a:t>và</a:t>
-            </a:r>
-            <a:r>
-              <a:rPr lang="en-US" sz="2400" dirty="0" smtClean="0"/>
-              <a:t> </a:t>
-            </a:r>
-            <a:r>
-              <a:rPr lang="en-US" sz="2400" dirty="0" err="1" smtClean="0"/>
-              <a:t>trả</a:t>
-            </a:r>
-            <a:r>
-              <a:rPr lang="en-US" sz="2400" dirty="0" smtClean="0"/>
-              <a:t> </a:t>
-            </a:r>
-            <a:r>
-              <a:rPr lang="en-US" sz="2400" dirty="0" err="1" smtClean="0"/>
-              <a:t>về</a:t>
-            </a:r>
-            <a:r>
-              <a:rPr lang="en-US" sz="2400" dirty="0" smtClean="0"/>
-              <a:t> </a:t>
-            </a:r>
-            <a:r>
-              <a:rPr lang="en-US" sz="2400" dirty="0" err="1" smtClean="0"/>
-              <a:t>kết</a:t>
-            </a:r>
-            <a:r>
-              <a:rPr lang="en-US" sz="2400" dirty="0" smtClean="0"/>
-              <a:t> </a:t>
-            </a:r>
-            <a:r>
-              <a:rPr lang="en-US" sz="2400" dirty="0" err="1" smtClean="0"/>
-              <a:t>quả</a:t>
-            </a:r>
-            <a:r>
-              <a:rPr lang="en-US" sz="2400" dirty="0" smtClean="0"/>
-              <a:t>.</a:t>
-            </a:r>
-          </a:p>
-          <a:p>
-            <a:pPr eaLnBrk="1" hangingPunct="1"/>
-            <a:endParaRPr lang="vi-VN" sz="2400" dirty="0" smtClean="0"/>
-          </a:p>
-        </p:txBody>
-      </p:sp>
-      <p:sp>
-        <p:nvSpPr>
-          <p:cNvPr id="2" name="Slide Number Placeholder 1"/>
-          <p:cNvSpPr>
-            <a:spLocks noGrp="1"/>
-          </p:cNvSpPr>
-          <p:nvPr>
-            <p:ph type="sldNum" sz="quarter" idx="12"/>
-          </p:nvPr>
-        </p:nvSpPr>
-        <p:spPr/>
-        <p:txBody>
-          <a:bodyPr/>
-          <a:lstStyle/>
-          <a:p>
-            <a:pPr>
-              <a:defRPr/>
-            </a:pPr>
-            <a:fld id="{A81E07A1-38DA-436E-9EB2-1E501CB9FFA7}" type="slidenum">
-              <a:rPr lang="vi-VN" smtClean="0"/>
-              <a:pPr>
-                <a:defRPr/>
-              </a:pPr>
-              <a:t>27</a:t>
-            </a:fld>
-            <a:endParaRPr lang="vi-VN" dirty="0"/>
           </a:p>
         </p:txBody>
       </p:sp>
@@ -33695,7 +33726,7 @@
           <a:graphicData uri="http://schemas.openxmlformats.org/presentationml/2006/ole">
             <mc:AlternateContent xmlns:mc="http://schemas.openxmlformats.org/markup-compatibility/2006">
               <mc:Choice xmlns:v="urn:schemas-microsoft-com:vml" Requires="v">
-                <p:oleObj spid="_x0000_s36204" name="Формула" r:id="rId3" imgW="4025900" imgH="1066800" progId="Equation.3">
+                <p:oleObj spid="_x0000_s36220" name="Формула" r:id="rId3" imgW="4025900" imgH="1066800" progId="Equation.3">
                   <p:embed/>
                 </p:oleObj>
               </mc:Choice>
@@ -34022,7 +34053,7 @@
           <a:graphicData uri="http://schemas.openxmlformats.org/presentationml/2006/ole">
             <mc:AlternateContent xmlns:mc="http://schemas.openxmlformats.org/markup-compatibility/2006">
               <mc:Choice xmlns:v="urn:schemas-microsoft-com:vml" Requires="v">
-                <p:oleObj spid="_x0000_s36205" name="Формула" r:id="rId5" imgW="3314700" imgH="1016000" progId="Equation.3">
+                <p:oleObj spid="_x0000_s36221" name="Формула" r:id="rId5" imgW="3314700" imgH="1016000" progId="Equation.3">
                   <p:embed/>
                 </p:oleObj>
               </mc:Choice>
@@ -34902,7 +34933,7 @@
           <a:graphicData uri="http://schemas.openxmlformats.org/presentationml/2006/ole">
             <mc:AlternateContent xmlns:mc="http://schemas.openxmlformats.org/markup-compatibility/2006">
               <mc:Choice xmlns:v="urn:schemas-microsoft-com:vml" Requires="v">
-                <p:oleObj spid="_x0000_s37227" name="Формула" r:id="rId3" imgW="3949700" imgH="482600" progId="Equation.3">
+                <p:oleObj spid="_x0000_s37243" name="Формула" r:id="rId3" imgW="3949700" imgH="482600" progId="Equation.3">
                   <p:embed/>
                 </p:oleObj>
               </mc:Choice>
@@ -35583,7 +35614,7 @@
             <a:graphicData uri="http://schemas.openxmlformats.org/presentationml/2006/ole">
               <mc:AlternateContent xmlns:mc="http://schemas.openxmlformats.org/markup-compatibility/2006">
                 <mc:Choice xmlns:v="urn:schemas-microsoft-com:vml" Requires="v">
-                  <p:oleObj spid="_x0000_s37228" name="Формула" r:id="rId5" imgW="2451100" imgH="457200" progId="Equation.3">
+                  <p:oleObj spid="_x0000_s37244" name="Формула" r:id="rId5" imgW="2451100" imgH="457200" progId="Equation.3">
                     <p:embed/>
                   </p:oleObj>
                 </mc:Choice>
@@ -36279,7 +36310,7 @@
           <a:graphicData uri="http://schemas.openxmlformats.org/presentationml/2006/ole">
             <mc:AlternateContent xmlns:mc="http://schemas.openxmlformats.org/markup-compatibility/2006">
               <mc:Choice xmlns:v="urn:schemas-microsoft-com:vml" Requires="v">
-                <p:oleObj spid="_x0000_s38069" name="Формула" r:id="rId3" imgW="3314700" imgH="1016000" progId="Equation.3">
+                <p:oleObj spid="_x0000_s38077" name="Формула" r:id="rId3" imgW="3314700" imgH="1016000" progId="Equation.3">
                   <p:embed/>
                 </p:oleObj>
               </mc:Choice>
@@ -36762,12 +36793,12 @@
           <a:graphicData uri="http://schemas.openxmlformats.org/presentationml/2006/ole">
             <mc:AlternateContent xmlns:mc="http://schemas.openxmlformats.org/markup-compatibility/2006">
               <mc:Choice xmlns:v="urn:schemas-microsoft-com:vml" Requires="v">
-                <p:oleObj spid="_x0000_s39094" name="Формула" r:id="rId3" imgW="3949700" imgH="482600" progId="Equation.3">
+                <p:oleObj spid="_x0000_s39102" name="Формула" r:id="rId4" imgW="3949700" imgH="482600" progId="Equation.3">
                   <p:embed/>
                 </p:oleObj>
               </mc:Choice>
               <mc:Fallback>
-                <p:oleObj name="Формула" r:id="rId3" imgW="3949700" imgH="482600" progId="Equation.3">
+                <p:oleObj name="Формула" r:id="rId4" imgW="3949700" imgH="482600" progId="Equation.3">
                   <p:embed/>
                   <p:pic>
                     <p:nvPicPr>
@@ -36778,7 +36809,7 @@
                       <p:nvPr/>
                     </p:nvPicPr>
                     <p:blipFill>
-                      <a:blip r:embed="rId4">
+                      <a:blip r:embed="rId5">
                         <a:extLst>
                           <a:ext uri="{28A0092B-C50C-407E-A947-70E740481C1C}">
                             <a14:useLocalDpi xmlns:a14="http://schemas.microsoft.com/office/drawing/2010/main" val="0"/>
@@ -36838,7 +36869,7 @@
           <p:nvPr/>
         </p:nvPicPr>
         <p:blipFill>
-          <a:blip r:embed="rId5"/>
+          <a:blip r:embed="rId6"/>
           <a:stretch>
             <a:fillRect/>
           </a:stretch>
@@ -37296,7 +37327,7 @@
           <a:graphicData uri="http://schemas.openxmlformats.org/presentationml/2006/ole">
             <mc:AlternateContent xmlns:mc="http://schemas.openxmlformats.org/markup-compatibility/2006">
               <mc:Choice xmlns:v="urn:schemas-microsoft-com:vml" Requires="v">
-                <p:oleObj spid="_x0000_s40118" name="Формула" r:id="rId3" imgW="3314700" imgH="1016000" progId="Equation.3">
+                <p:oleObj spid="_x0000_s40126" name="Формула" r:id="rId3" imgW="3314700" imgH="1016000" progId="Equation.3">
                   <p:embed/>
                 </p:oleObj>
               </mc:Choice>
@@ -38871,11 +38902,7 @@
             </a:r>
             <a:r>
               <a:rPr lang="en-US" sz="2000" b="0" dirty="0" err="1" smtClean="0"/>
-              <a:t>bả</a:t>
-            </a:r>
-            <a:r>
-              <a:rPr lang="en-US" sz="2000" b="0" dirty="0" err="1" smtClean="0"/>
-              <a:t>n</a:t>
+              <a:t>bản</a:t>
             </a:r>
             <a:r>
               <a:rPr lang="en-US" sz="2000" b="0" dirty="0" smtClean="0"/>
@@ -39764,15 +39791,7 @@
                   <a:schemeClr val="tx2"/>
                 </a:solidFill>
               </a:rPr>
-              <a:t> </a:t>
-            </a:r>
-            <a:r>
-              <a:rPr lang="vi-VN" sz="2000" b="0" dirty="0" smtClean="0">
-                <a:solidFill>
-                  <a:schemeClr val="tx2"/>
-                </a:solidFill>
-              </a:rPr>
-              <a:t>nhưng vẫn là đề tài nóng trong tìm kiếm thông tin hiện đại.</a:t>
+              <a:t> nhưng vẫn là đề tài nóng trong tìm kiếm thông tin hiện đại.</a:t>
             </a:r>
             <a:endParaRPr lang="vi-VN" sz="2000" b="0" dirty="0">
               <a:solidFill>
@@ -39925,19 +39944,11 @@
             </a:r>
             <a:r>
               <a:rPr lang="en-US" sz="2400" dirty="0" smtClean="0"/>
-              <a:t> </a:t>
-            </a:r>
-            <a:r>
-              <a:rPr lang="en-US" sz="2400" dirty="0" smtClean="0"/>
-              <a:t>R</a:t>
+              <a:t> R</a:t>
             </a:r>
             <a:r>
               <a:rPr lang="en-US" sz="2400" baseline="-25000" dirty="0" smtClean="0"/>
-              <a:t>d</a:t>
-            </a:r>
-            <a:r>
-              <a:rPr lang="en-US" sz="2400" baseline="-25000" dirty="0" smtClean="0"/>
-              <a:t>, q</a:t>
+              <a:t>d, q</a:t>
             </a:r>
             <a:r>
               <a:rPr lang="en-US" sz="2400" dirty="0" smtClean="0"/>
@@ -40701,7 +40712,6 @@
               <a:rPr lang="en-US" sz="2400" dirty="0" smtClean="0"/>
               <a:t>.</a:t>
             </a:r>
-            <a:endParaRPr lang="en-US" sz="2400" dirty="0" smtClean="0"/>
           </a:p>
           <a:p>
             <a:pPr eaLnBrk="1" hangingPunct="1">
@@ -41280,7 +41290,6 @@
               <a:rPr lang="en-US" sz="2800" dirty="0" smtClean="0"/>
               <a:t>.”</a:t>
             </a:r>
-            <a:endParaRPr lang="en-US" sz="2800" dirty="0" smtClean="0"/>
           </a:p>
           <a:p>
             <a:pPr marL="0" indent="0" algn="just" eaLnBrk="1" hangingPunct="1">
@@ -41449,13 +41458,8 @@
             </a:r>
             <a:r>
               <a:rPr lang="en-US" sz="2800" dirty="0" smtClean="0"/>
-              <a:t> </a:t>
-            </a:r>
-            <a:r>
-              <a:rPr lang="en-US" sz="2800" dirty="0" smtClean="0"/>
-              <a:t>Bayes.”</a:t>
-            </a:r>
-            <a:endParaRPr lang="en-US" sz="2800" dirty="0" smtClean="0"/>
+              <a:t> Bayes.”</a:t>
+            </a:r>
           </a:p>
           <a:p>
             <a:pPr marL="0" indent="0" algn="r" eaLnBrk="1" hangingPunct="1">
@@ -42594,7 +42598,7 @@
   </a:extraClrSchemeLst>
   <a:extLst>
     <a:ext uri="{05A4C25C-085E-4340-85A3-A5531E510DB2}">
-      <thm15:themeFamily xmlns="" xmlns:thm15="http://schemas.microsoft.com/office/thememl/2012/main" name="Office Theme" id="{62F939B6-93AF-4DB8-9C6B-D6C7DFDC589F}" vid="{4A3C46E8-61CC-4603-A589-7422A47A8E4A}"/>
+      <thm15:themeFamily xmlns:thm15="http://schemas.microsoft.com/office/thememl/2012/main" xmlns="" name="Office Theme" id="{62F939B6-93AF-4DB8-9C6B-D6C7DFDC589F}" vid="{4A3C46E8-61CC-4603-A589-7422A47A8E4A}"/>
     </a:ext>
   </a:extLst>
 </a:theme>
@@ -42855,7 +42859,7 @@
   <a:extraClrSchemeLst/>
   <a:extLst>
     <a:ext uri="{05A4C25C-085E-4340-85A3-A5531E510DB2}">
-      <thm15:themeFamily xmlns="" xmlns:thm15="http://schemas.microsoft.com/office/thememl/2012/main" name="Office Theme" id="{62F939B6-93AF-4DB8-9C6B-D6C7DFDC589F}" vid="{4A3C46E8-61CC-4603-A589-7422A47A8E4A}"/>
+      <thm15:themeFamily xmlns:thm15="http://schemas.microsoft.com/office/thememl/2012/main" xmlns="" name="Office Theme" id="{62F939B6-93AF-4DB8-9C6B-D6C7DFDC589F}" vid="{4A3C46E8-61CC-4603-A589-7422A47A8E4A}"/>
     </a:ext>
   </a:extLst>
 </a:theme>

</xml_diff>